<commit_message>
Bille erläutert und Stückliste angefangen
</commit_message>
<xml_diff>
--- a/Grafiken.pptx
+++ b/Grafiken.pptx
@@ -140,7 +140,7 @@
           <p:cNvPr id="2" name="Titel 1">
             <a:extLst>
               <a:ext uri="{FF2B5EF4-FFF2-40B4-BE49-F238E27FC236}">
-                <a16:creationId xmlns:a16="http://schemas.microsoft.com/office/drawing/2014/main" id="{D054F791-FDFE-45DB-A5DE-2DF1BE92F85B}"/>
+                <a16:creationId xmlns:a16="http://schemas.microsoft.com/office/drawing/2014/main" xmlns="" id="{D054F791-FDFE-45DB-A5DE-2DF1BE92F85B}"/>
               </a:ext>
             </a:extLst>
           </p:cNvPr>
@@ -177,7 +177,7 @@
           <p:cNvPr id="3" name="Untertitel 2">
             <a:extLst>
               <a:ext uri="{FF2B5EF4-FFF2-40B4-BE49-F238E27FC236}">
-                <a16:creationId xmlns:a16="http://schemas.microsoft.com/office/drawing/2014/main" id="{D9FC3CB6-D780-473A-92CE-B73F3B67D2C5}"/>
+                <a16:creationId xmlns:a16="http://schemas.microsoft.com/office/drawing/2014/main" xmlns="" id="{D9FC3CB6-D780-473A-92CE-B73F3B67D2C5}"/>
               </a:ext>
             </a:extLst>
           </p:cNvPr>
@@ -247,7 +247,7 @@
           <p:cNvPr id="4" name="Datumsplatzhalter 3">
             <a:extLst>
               <a:ext uri="{FF2B5EF4-FFF2-40B4-BE49-F238E27FC236}">
-                <a16:creationId xmlns:a16="http://schemas.microsoft.com/office/drawing/2014/main" id="{DA340506-398A-4D8D-BAA1-5A36402E7936}"/>
+                <a16:creationId xmlns:a16="http://schemas.microsoft.com/office/drawing/2014/main" xmlns="" id="{DA340506-398A-4D8D-BAA1-5A36402E7936}"/>
               </a:ext>
             </a:extLst>
           </p:cNvPr>
@@ -265,7 +265,7 @@
           <a:p>
             <a:fld id="{1A473A71-948F-4AE8-AF79-80443CCFF2D0}" type="datetimeFigureOut">
               <a:rPr lang="de-DE" smtClean="0"/>
-              <a:t>03.02.2020</a:t>
+              <a:t>17.02.2020</a:t>
             </a:fld>
             <a:endParaRPr lang="de-DE"/>
           </a:p>
@@ -276,7 +276,7 @@
           <p:cNvPr id="5" name="Fußzeilenplatzhalter 4">
             <a:extLst>
               <a:ext uri="{FF2B5EF4-FFF2-40B4-BE49-F238E27FC236}">
-                <a16:creationId xmlns:a16="http://schemas.microsoft.com/office/drawing/2014/main" id="{B089376D-1E61-4121-BCEF-8BA3EB26D315}"/>
+                <a16:creationId xmlns:a16="http://schemas.microsoft.com/office/drawing/2014/main" xmlns="" id="{B089376D-1E61-4121-BCEF-8BA3EB26D315}"/>
               </a:ext>
             </a:extLst>
           </p:cNvPr>
@@ -301,7 +301,7 @@
           <p:cNvPr id="6" name="Foliennummernplatzhalter 5">
             <a:extLst>
               <a:ext uri="{FF2B5EF4-FFF2-40B4-BE49-F238E27FC236}">
-                <a16:creationId xmlns:a16="http://schemas.microsoft.com/office/drawing/2014/main" id="{02DB40F9-3A50-466C-A042-FE8C85D5930A}"/>
+                <a16:creationId xmlns:a16="http://schemas.microsoft.com/office/drawing/2014/main" xmlns="" id="{02DB40F9-3A50-466C-A042-FE8C85D5930A}"/>
               </a:ext>
             </a:extLst>
           </p:cNvPr>
@@ -360,7 +360,7 @@
           <p:cNvPr id="2" name="Titel 1">
             <a:extLst>
               <a:ext uri="{FF2B5EF4-FFF2-40B4-BE49-F238E27FC236}">
-                <a16:creationId xmlns:a16="http://schemas.microsoft.com/office/drawing/2014/main" id="{75B0AD80-83E0-420E-A62C-6DFA28296E84}"/>
+                <a16:creationId xmlns:a16="http://schemas.microsoft.com/office/drawing/2014/main" xmlns="" id="{75B0AD80-83E0-420E-A62C-6DFA28296E84}"/>
               </a:ext>
             </a:extLst>
           </p:cNvPr>
@@ -388,7 +388,7 @@
           <p:cNvPr id="3" name="Vertikaler Textplatzhalter 2">
             <a:extLst>
               <a:ext uri="{FF2B5EF4-FFF2-40B4-BE49-F238E27FC236}">
-                <a16:creationId xmlns:a16="http://schemas.microsoft.com/office/drawing/2014/main" id="{90A2EC08-344C-424E-8783-267C36556823}"/>
+                <a16:creationId xmlns:a16="http://schemas.microsoft.com/office/drawing/2014/main" xmlns="" id="{90A2EC08-344C-424E-8783-267C36556823}"/>
               </a:ext>
             </a:extLst>
           </p:cNvPr>
@@ -445,7 +445,7 @@
           <p:cNvPr id="4" name="Datumsplatzhalter 3">
             <a:extLst>
               <a:ext uri="{FF2B5EF4-FFF2-40B4-BE49-F238E27FC236}">
-                <a16:creationId xmlns:a16="http://schemas.microsoft.com/office/drawing/2014/main" id="{128EC0FC-B775-4FA6-B4D8-9489D5BB93EC}"/>
+                <a16:creationId xmlns:a16="http://schemas.microsoft.com/office/drawing/2014/main" xmlns="" id="{128EC0FC-B775-4FA6-B4D8-9489D5BB93EC}"/>
               </a:ext>
             </a:extLst>
           </p:cNvPr>
@@ -463,7 +463,7 @@
           <a:p>
             <a:fld id="{1A473A71-948F-4AE8-AF79-80443CCFF2D0}" type="datetimeFigureOut">
               <a:rPr lang="de-DE" smtClean="0"/>
-              <a:t>03.02.2020</a:t>
+              <a:t>17.02.2020</a:t>
             </a:fld>
             <a:endParaRPr lang="de-DE"/>
           </a:p>
@@ -474,7 +474,7 @@
           <p:cNvPr id="5" name="Fußzeilenplatzhalter 4">
             <a:extLst>
               <a:ext uri="{FF2B5EF4-FFF2-40B4-BE49-F238E27FC236}">
-                <a16:creationId xmlns:a16="http://schemas.microsoft.com/office/drawing/2014/main" id="{412C3EAE-4FE4-4720-8D6E-F6816C8F304A}"/>
+                <a16:creationId xmlns:a16="http://schemas.microsoft.com/office/drawing/2014/main" xmlns="" id="{412C3EAE-4FE4-4720-8D6E-F6816C8F304A}"/>
               </a:ext>
             </a:extLst>
           </p:cNvPr>
@@ -499,7 +499,7 @@
           <p:cNvPr id="6" name="Foliennummernplatzhalter 5">
             <a:extLst>
               <a:ext uri="{FF2B5EF4-FFF2-40B4-BE49-F238E27FC236}">
-                <a16:creationId xmlns:a16="http://schemas.microsoft.com/office/drawing/2014/main" id="{6E23C3DA-410C-46C9-A48F-2F369138076C}"/>
+                <a16:creationId xmlns:a16="http://schemas.microsoft.com/office/drawing/2014/main" xmlns="" id="{6E23C3DA-410C-46C9-A48F-2F369138076C}"/>
               </a:ext>
             </a:extLst>
           </p:cNvPr>
@@ -558,7 +558,7 @@
           <p:cNvPr id="2" name="Vertikaler Titel 1">
             <a:extLst>
               <a:ext uri="{FF2B5EF4-FFF2-40B4-BE49-F238E27FC236}">
-                <a16:creationId xmlns:a16="http://schemas.microsoft.com/office/drawing/2014/main" id="{779DABB7-23CD-44DC-ADD7-FC700BA1902C}"/>
+                <a16:creationId xmlns:a16="http://schemas.microsoft.com/office/drawing/2014/main" xmlns="" id="{779DABB7-23CD-44DC-ADD7-FC700BA1902C}"/>
               </a:ext>
             </a:extLst>
           </p:cNvPr>
@@ -591,7 +591,7 @@
           <p:cNvPr id="3" name="Vertikaler Textplatzhalter 2">
             <a:extLst>
               <a:ext uri="{FF2B5EF4-FFF2-40B4-BE49-F238E27FC236}">
-                <a16:creationId xmlns:a16="http://schemas.microsoft.com/office/drawing/2014/main" id="{6C706723-6E5E-40B8-8F65-A3D2B7A8F634}"/>
+                <a16:creationId xmlns:a16="http://schemas.microsoft.com/office/drawing/2014/main" xmlns="" id="{6C706723-6E5E-40B8-8F65-A3D2B7A8F634}"/>
               </a:ext>
             </a:extLst>
           </p:cNvPr>
@@ -653,7 +653,7 @@
           <p:cNvPr id="4" name="Datumsplatzhalter 3">
             <a:extLst>
               <a:ext uri="{FF2B5EF4-FFF2-40B4-BE49-F238E27FC236}">
-                <a16:creationId xmlns:a16="http://schemas.microsoft.com/office/drawing/2014/main" id="{BC131E27-F41D-46A6-9C91-2D95E382E465}"/>
+                <a16:creationId xmlns:a16="http://schemas.microsoft.com/office/drawing/2014/main" xmlns="" id="{BC131E27-F41D-46A6-9C91-2D95E382E465}"/>
               </a:ext>
             </a:extLst>
           </p:cNvPr>
@@ -671,7 +671,7 @@
           <a:p>
             <a:fld id="{1A473A71-948F-4AE8-AF79-80443CCFF2D0}" type="datetimeFigureOut">
               <a:rPr lang="de-DE" smtClean="0"/>
-              <a:t>03.02.2020</a:t>
+              <a:t>17.02.2020</a:t>
             </a:fld>
             <a:endParaRPr lang="de-DE"/>
           </a:p>
@@ -682,7 +682,7 @@
           <p:cNvPr id="5" name="Fußzeilenplatzhalter 4">
             <a:extLst>
               <a:ext uri="{FF2B5EF4-FFF2-40B4-BE49-F238E27FC236}">
-                <a16:creationId xmlns:a16="http://schemas.microsoft.com/office/drawing/2014/main" id="{3EFC22C0-4A3F-48ED-AD9A-CCB249315EBC}"/>
+                <a16:creationId xmlns:a16="http://schemas.microsoft.com/office/drawing/2014/main" xmlns="" id="{3EFC22C0-4A3F-48ED-AD9A-CCB249315EBC}"/>
               </a:ext>
             </a:extLst>
           </p:cNvPr>
@@ -707,7 +707,7 @@
           <p:cNvPr id="6" name="Foliennummernplatzhalter 5">
             <a:extLst>
               <a:ext uri="{FF2B5EF4-FFF2-40B4-BE49-F238E27FC236}">
-                <a16:creationId xmlns:a16="http://schemas.microsoft.com/office/drawing/2014/main" id="{B154A3F9-67AB-4278-915D-7D40AD5497AB}"/>
+                <a16:creationId xmlns:a16="http://schemas.microsoft.com/office/drawing/2014/main" xmlns="" id="{B154A3F9-67AB-4278-915D-7D40AD5497AB}"/>
               </a:ext>
             </a:extLst>
           </p:cNvPr>
@@ -766,7 +766,7 @@
           <p:cNvPr id="2" name="Titel 1">
             <a:extLst>
               <a:ext uri="{FF2B5EF4-FFF2-40B4-BE49-F238E27FC236}">
-                <a16:creationId xmlns:a16="http://schemas.microsoft.com/office/drawing/2014/main" id="{194CD684-B8F5-462F-96F1-A1A2EAA93923}"/>
+                <a16:creationId xmlns:a16="http://schemas.microsoft.com/office/drawing/2014/main" xmlns="" id="{194CD684-B8F5-462F-96F1-A1A2EAA93923}"/>
               </a:ext>
             </a:extLst>
           </p:cNvPr>
@@ -794,7 +794,7 @@
           <p:cNvPr id="3" name="Inhaltsplatzhalter 2">
             <a:extLst>
               <a:ext uri="{FF2B5EF4-FFF2-40B4-BE49-F238E27FC236}">
-                <a16:creationId xmlns:a16="http://schemas.microsoft.com/office/drawing/2014/main" id="{2DE009A3-ADC6-4368-BF82-51F6A918072A}"/>
+                <a16:creationId xmlns:a16="http://schemas.microsoft.com/office/drawing/2014/main" xmlns="" id="{2DE009A3-ADC6-4368-BF82-51F6A918072A}"/>
               </a:ext>
             </a:extLst>
           </p:cNvPr>
@@ -851,7 +851,7 @@
           <p:cNvPr id="4" name="Datumsplatzhalter 3">
             <a:extLst>
               <a:ext uri="{FF2B5EF4-FFF2-40B4-BE49-F238E27FC236}">
-                <a16:creationId xmlns:a16="http://schemas.microsoft.com/office/drawing/2014/main" id="{EAA3C83C-1905-4AD8-9072-1E614DFF010C}"/>
+                <a16:creationId xmlns:a16="http://schemas.microsoft.com/office/drawing/2014/main" xmlns="" id="{EAA3C83C-1905-4AD8-9072-1E614DFF010C}"/>
               </a:ext>
             </a:extLst>
           </p:cNvPr>
@@ -869,7 +869,7 @@
           <a:p>
             <a:fld id="{1A473A71-948F-4AE8-AF79-80443CCFF2D0}" type="datetimeFigureOut">
               <a:rPr lang="de-DE" smtClean="0"/>
-              <a:t>03.02.2020</a:t>
+              <a:t>17.02.2020</a:t>
             </a:fld>
             <a:endParaRPr lang="de-DE"/>
           </a:p>
@@ -880,7 +880,7 @@
           <p:cNvPr id="5" name="Fußzeilenplatzhalter 4">
             <a:extLst>
               <a:ext uri="{FF2B5EF4-FFF2-40B4-BE49-F238E27FC236}">
-                <a16:creationId xmlns:a16="http://schemas.microsoft.com/office/drawing/2014/main" id="{74668DA4-1006-40BE-BF4B-64122EDAAEB2}"/>
+                <a16:creationId xmlns:a16="http://schemas.microsoft.com/office/drawing/2014/main" xmlns="" id="{74668DA4-1006-40BE-BF4B-64122EDAAEB2}"/>
               </a:ext>
             </a:extLst>
           </p:cNvPr>
@@ -905,7 +905,7 @@
           <p:cNvPr id="6" name="Foliennummernplatzhalter 5">
             <a:extLst>
               <a:ext uri="{FF2B5EF4-FFF2-40B4-BE49-F238E27FC236}">
-                <a16:creationId xmlns:a16="http://schemas.microsoft.com/office/drawing/2014/main" id="{77E97918-B9C7-48AF-B834-C298722702AD}"/>
+                <a16:creationId xmlns:a16="http://schemas.microsoft.com/office/drawing/2014/main" xmlns="" id="{77E97918-B9C7-48AF-B834-C298722702AD}"/>
               </a:ext>
             </a:extLst>
           </p:cNvPr>
@@ -964,7 +964,7 @@
           <p:cNvPr id="2" name="Titel 1">
             <a:extLst>
               <a:ext uri="{FF2B5EF4-FFF2-40B4-BE49-F238E27FC236}">
-                <a16:creationId xmlns:a16="http://schemas.microsoft.com/office/drawing/2014/main" id="{7BCE8A32-E9B6-4971-BA75-BC23D626AF9F}"/>
+                <a16:creationId xmlns:a16="http://schemas.microsoft.com/office/drawing/2014/main" xmlns="" id="{7BCE8A32-E9B6-4971-BA75-BC23D626AF9F}"/>
               </a:ext>
             </a:extLst>
           </p:cNvPr>
@@ -1001,7 +1001,7 @@
           <p:cNvPr id="3" name="Textplatzhalter 2">
             <a:extLst>
               <a:ext uri="{FF2B5EF4-FFF2-40B4-BE49-F238E27FC236}">
-                <a16:creationId xmlns:a16="http://schemas.microsoft.com/office/drawing/2014/main" id="{895911F2-3387-48CF-AF52-DE28FF068F6D}"/>
+                <a16:creationId xmlns:a16="http://schemas.microsoft.com/office/drawing/2014/main" xmlns="" id="{895911F2-3387-48CF-AF52-DE28FF068F6D}"/>
               </a:ext>
             </a:extLst>
           </p:cNvPr>
@@ -1126,7 +1126,7 @@
           <p:cNvPr id="4" name="Datumsplatzhalter 3">
             <a:extLst>
               <a:ext uri="{FF2B5EF4-FFF2-40B4-BE49-F238E27FC236}">
-                <a16:creationId xmlns:a16="http://schemas.microsoft.com/office/drawing/2014/main" id="{793E7EFC-478E-489A-88D5-2912B680477B}"/>
+                <a16:creationId xmlns:a16="http://schemas.microsoft.com/office/drawing/2014/main" xmlns="" id="{793E7EFC-478E-489A-88D5-2912B680477B}"/>
               </a:ext>
             </a:extLst>
           </p:cNvPr>
@@ -1144,7 +1144,7 @@
           <a:p>
             <a:fld id="{1A473A71-948F-4AE8-AF79-80443CCFF2D0}" type="datetimeFigureOut">
               <a:rPr lang="de-DE" smtClean="0"/>
-              <a:t>03.02.2020</a:t>
+              <a:t>17.02.2020</a:t>
             </a:fld>
             <a:endParaRPr lang="de-DE"/>
           </a:p>
@@ -1155,7 +1155,7 @@
           <p:cNvPr id="5" name="Fußzeilenplatzhalter 4">
             <a:extLst>
               <a:ext uri="{FF2B5EF4-FFF2-40B4-BE49-F238E27FC236}">
-                <a16:creationId xmlns:a16="http://schemas.microsoft.com/office/drawing/2014/main" id="{4201F9E8-FA45-4869-9C2C-20D7B1DA9711}"/>
+                <a16:creationId xmlns:a16="http://schemas.microsoft.com/office/drawing/2014/main" xmlns="" id="{4201F9E8-FA45-4869-9C2C-20D7B1DA9711}"/>
               </a:ext>
             </a:extLst>
           </p:cNvPr>
@@ -1180,7 +1180,7 @@
           <p:cNvPr id="6" name="Foliennummernplatzhalter 5">
             <a:extLst>
               <a:ext uri="{FF2B5EF4-FFF2-40B4-BE49-F238E27FC236}">
-                <a16:creationId xmlns:a16="http://schemas.microsoft.com/office/drawing/2014/main" id="{ECDB6699-79D1-4E45-A973-543AE972A0CB}"/>
+                <a16:creationId xmlns:a16="http://schemas.microsoft.com/office/drawing/2014/main" xmlns="" id="{ECDB6699-79D1-4E45-A973-543AE972A0CB}"/>
               </a:ext>
             </a:extLst>
           </p:cNvPr>
@@ -1239,7 +1239,7 @@
           <p:cNvPr id="2" name="Titel 1">
             <a:extLst>
               <a:ext uri="{FF2B5EF4-FFF2-40B4-BE49-F238E27FC236}">
-                <a16:creationId xmlns:a16="http://schemas.microsoft.com/office/drawing/2014/main" id="{5D1E23C8-25D1-4AD9-889E-C2CD479166C3}"/>
+                <a16:creationId xmlns:a16="http://schemas.microsoft.com/office/drawing/2014/main" xmlns="" id="{5D1E23C8-25D1-4AD9-889E-C2CD479166C3}"/>
               </a:ext>
             </a:extLst>
           </p:cNvPr>
@@ -1267,7 +1267,7 @@
           <p:cNvPr id="3" name="Inhaltsplatzhalter 2">
             <a:extLst>
               <a:ext uri="{FF2B5EF4-FFF2-40B4-BE49-F238E27FC236}">
-                <a16:creationId xmlns:a16="http://schemas.microsoft.com/office/drawing/2014/main" id="{7D059B41-7381-4263-9356-D85F4790208B}"/>
+                <a16:creationId xmlns:a16="http://schemas.microsoft.com/office/drawing/2014/main" xmlns="" id="{7D059B41-7381-4263-9356-D85F4790208B}"/>
               </a:ext>
             </a:extLst>
           </p:cNvPr>
@@ -1329,7 +1329,7 @@
           <p:cNvPr id="4" name="Inhaltsplatzhalter 3">
             <a:extLst>
               <a:ext uri="{FF2B5EF4-FFF2-40B4-BE49-F238E27FC236}">
-                <a16:creationId xmlns:a16="http://schemas.microsoft.com/office/drawing/2014/main" id="{FCF7CF5D-582B-45C7-9CF2-C0A89E49F53D}"/>
+                <a16:creationId xmlns:a16="http://schemas.microsoft.com/office/drawing/2014/main" xmlns="" id="{FCF7CF5D-582B-45C7-9CF2-C0A89E49F53D}"/>
               </a:ext>
             </a:extLst>
           </p:cNvPr>
@@ -1391,7 +1391,7 @@
           <p:cNvPr id="5" name="Datumsplatzhalter 4">
             <a:extLst>
               <a:ext uri="{FF2B5EF4-FFF2-40B4-BE49-F238E27FC236}">
-                <a16:creationId xmlns:a16="http://schemas.microsoft.com/office/drawing/2014/main" id="{0FCD61F8-DB42-4D35-A733-C809867FE96A}"/>
+                <a16:creationId xmlns:a16="http://schemas.microsoft.com/office/drawing/2014/main" xmlns="" id="{0FCD61F8-DB42-4D35-A733-C809867FE96A}"/>
               </a:ext>
             </a:extLst>
           </p:cNvPr>
@@ -1409,7 +1409,7 @@
           <a:p>
             <a:fld id="{1A473A71-948F-4AE8-AF79-80443CCFF2D0}" type="datetimeFigureOut">
               <a:rPr lang="de-DE" smtClean="0"/>
-              <a:t>03.02.2020</a:t>
+              <a:t>17.02.2020</a:t>
             </a:fld>
             <a:endParaRPr lang="de-DE"/>
           </a:p>
@@ -1420,7 +1420,7 @@
           <p:cNvPr id="6" name="Fußzeilenplatzhalter 5">
             <a:extLst>
               <a:ext uri="{FF2B5EF4-FFF2-40B4-BE49-F238E27FC236}">
-                <a16:creationId xmlns:a16="http://schemas.microsoft.com/office/drawing/2014/main" id="{75289BAC-A270-4992-89AF-C651CFF52F74}"/>
+                <a16:creationId xmlns:a16="http://schemas.microsoft.com/office/drawing/2014/main" xmlns="" id="{75289BAC-A270-4992-89AF-C651CFF52F74}"/>
               </a:ext>
             </a:extLst>
           </p:cNvPr>
@@ -1445,7 +1445,7 @@
           <p:cNvPr id="7" name="Foliennummernplatzhalter 6">
             <a:extLst>
               <a:ext uri="{FF2B5EF4-FFF2-40B4-BE49-F238E27FC236}">
-                <a16:creationId xmlns:a16="http://schemas.microsoft.com/office/drawing/2014/main" id="{76F233E0-21AA-4E86-AFF4-50FF420F34F9}"/>
+                <a16:creationId xmlns:a16="http://schemas.microsoft.com/office/drawing/2014/main" xmlns="" id="{76F233E0-21AA-4E86-AFF4-50FF420F34F9}"/>
               </a:ext>
             </a:extLst>
           </p:cNvPr>
@@ -1504,7 +1504,7 @@
           <p:cNvPr id="2" name="Titel 1">
             <a:extLst>
               <a:ext uri="{FF2B5EF4-FFF2-40B4-BE49-F238E27FC236}">
-                <a16:creationId xmlns:a16="http://schemas.microsoft.com/office/drawing/2014/main" id="{6B2AA633-88E7-4EE3-A2AB-512F8DA217E7}"/>
+                <a16:creationId xmlns:a16="http://schemas.microsoft.com/office/drawing/2014/main" xmlns="" id="{6B2AA633-88E7-4EE3-A2AB-512F8DA217E7}"/>
               </a:ext>
             </a:extLst>
           </p:cNvPr>
@@ -1537,7 +1537,7 @@
           <p:cNvPr id="3" name="Textplatzhalter 2">
             <a:extLst>
               <a:ext uri="{FF2B5EF4-FFF2-40B4-BE49-F238E27FC236}">
-                <a16:creationId xmlns:a16="http://schemas.microsoft.com/office/drawing/2014/main" id="{70C41C20-4431-40FE-B7B2-903A1E378899}"/>
+                <a16:creationId xmlns:a16="http://schemas.microsoft.com/office/drawing/2014/main" xmlns="" id="{70C41C20-4431-40FE-B7B2-903A1E378899}"/>
               </a:ext>
             </a:extLst>
           </p:cNvPr>
@@ -1608,7 +1608,7 @@
           <p:cNvPr id="4" name="Inhaltsplatzhalter 3">
             <a:extLst>
               <a:ext uri="{FF2B5EF4-FFF2-40B4-BE49-F238E27FC236}">
-                <a16:creationId xmlns:a16="http://schemas.microsoft.com/office/drawing/2014/main" id="{26EA8628-3D90-43BC-B92A-3EA8EE72F2A1}"/>
+                <a16:creationId xmlns:a16="http://schemas.microsoft.com/office/drawing/2014/main" xmlns="" id="{26EA8628-3D90-43BC-B92A-3EA8EE72F2A1}"/>
               </a:ext>
             </a:extLst>
           </p:cNvPr>
@@ -1670,7 +1670,7 @@
           <p:cNvPr id="5" name="Textplatzhalter 4">
             <a:extLst>
               <a:ext uri="{FF2B5EF4-FFF2-40B4-BE49-F238E27FC236}">
-                <a16:creationId xmlns:a16="http://schemas.microsoft.com/office/drawing/2014/main" id="{3D75AA0A-6638-41B2-9FE4-6928963B9230}"/>
+                <a16:creationId xmlns:a16="http://schemas.microsoft.com/office/drawing/2014/main" xmlns="" id="{3D75AA0A-6638-41B2-9FE4-6928963B9230}"/>
               </a:ext>
             </a:extLst>
           </p:cNvPr>
@@ -1741,7 +1741,7 @@
           <p:cNvPr id="6" name="Inhaltsplatzhalter 5">
             <a:extLst>
               <a:ext uri="{FF2B5EF4-FFF2-40B4-BE49-F238E27FC236}">
-                <a16:creationId xmlns:a16="http://schemas.microsoft.com/office/drawing/2014/main" id="{1C195763-A791-4A96-BEFD-614CD541D847}"/>
+                <a16:creationId xmlns:a16="http://schemas.microsoft.com/office/drawing/2014/main" xmlns="" id="{1C195763-A791-4A96-BEFD-614CD541D847}"/>
               </a:ext>
             </a:extLst>
           </p:cNvPr>
@@ -1803,7 +1803,7 @@
           <p:cNvPr id="7" name="Datumsplatzhalter 6">
             <a:extLst>
               <a:ext uri="{FF2B5EF4-FFF2-40B4-BE49-F238E27FC236}">
-                <a16:creationId xmlns:a16="http://schemas.microsoft.com/office/drawing/2014/main" id="{6BAF1489-546D-4A63-AD49-2BF65852FCE3}"/>
+                <a16:creationId xmlns:a16="http://schemas.microsoft.com/office/drawing/2014/main" xmlns="" id="{6BAF1489-546D-4A63-AD49-2BF65852FCE3}"/>
               </a:ext>
             </a:extLst>
           </p:cNvPr>
@@ -1821,7 +1821,7 @@
           <a:p>
             <a:fld id="{1A473A71-948F-4AE8-AF79-80443CCFF2D0}" type="datetimeFigureOut">
               <a:rPr lang="de-DE" smtClean="0"/>
-              <a:t>03.02.2020</a:t>
+              <a:t>17.02.2020</a:t>
             </a:fld>
             <a:endParaRPr lang="de-DE"/>
           </a:p>
@@ -1832,7 +1832,7 @@
           <p:cNvPr id="8" name="Fußzeilenplatzhalter 7">
             <a:extLst>
               <a:ext uri="{FF2B5EF4-FFF2-40B4-BE49-F238E27FC236}">
-                <a16:creationId xmlns:a16="http://schemas.microsoft.com/office/drawing/2014/main" id="{B899682B-977D-40D0-ACCB-728613E4AADF}"/>
+                <a16:creationId xmlns:a16="http://schemas.microsoft.com/office/drawing/2014/main" xmlns="" id="{B899682B-977D-40D0-ACCB-728613E4AADF}"/>
               </a:ext>
             </a:extLst>
           </p:cNvPr>
@@ -1857,7 +1857,7 @@
           <p:cNvPr id="9" name="Foliennummernplatzhalter 8">
             <a:extLst>
               <a:ext uri="{FF2B5EF4-FFF2-40B4-BE49-F238E27FC236}">
-                <a16:creationId xmlns:a16="http://schemas.microsoft.com/office/drawing/2014/main" id="{897B2334-EC81-46CD-ACE5-583C635F813E}"/>
+                <a16:creationId xmlns:a16="http://schemas.microsoft.com/office/drawing/2014/main" xmlns="" id="{897B2334-EC81-46CD-ACE5-583C635F813E}"/>
               </a:ext>
             </a:extLst>
           </p:cNvPr>
@@ -1916,7 +1916,7 @@
           <p:cNvPr id="2" name="Titel 1">
             <a:extLst>
               <a:ext uri="{FF2B5EF4-FFF2-40B4-BE49-F238E27FC236}">
-                <a16:creationId xmlns:a16="http://schemas.microsoft.com/office/drawing/2014/main" id="{60BFEE5B-1FFB-4DEE-9D07-BA63A5C16C1A}"/>
+                <a16:creationId xmlns:a16="http://schemas.microsoft.com/office/drawing/2014/main" xmlns="" id="{60BFEE5B-1FFB-4DEE-9D07-BA63A5C16C1A}"/>
               </a:ext>
             </a:extLst>
           </p:cNvPr>
@@ -1944,7 +1944,7 @@
           <p:cNvPr id="3" name="Datumsplatzhalter 2">
             <a:extLst>
               <a:ext uri="{FF2B5EF4-FFF2-40B4-BE49-F238E27FC236}">
-                <a16:creationId xmlns:a16="http://schemas.microsoft.com/office/drawing/2014/main" id="{D2AEF728-552C-4928-81E0-4F9AED16A550}"/>
+                <a16:creationId xmlns:a16="http://schemas.microsoft.com/office/drawing/2014/main" xmlns="" id="{D2AEF728-552C-4928-81E0-4F9AED16A550}"/>
               </a:ext>
             </a:extLst>
           </p:cNvPr>
@@ -1962,7 +1962,7 @@
           <a:p>
             <a:fld id="{1A473A71-948F-4AE8-AF79-80443CCFF2D0}" type="datetimeFigureOut">
               <a:rPr lang="de-DE" smtClean="0"/>
-              <a:t>03.02.2020</a:t>
+              <a:t>17.02.2020</a:t>
             </a:fld>
             <a:endParaRPr lang="de-DE"/>
           </a:p>
@@ -1973,7 +1973,7 @@
           <p:cNvPr id="4" name="Fußzeilenplatzhalter 3">
             <a:extLst>
               <a:ext uri="{FF2B5EF4-FFF2-40B4-BE49-F238E27FC236}">
-                <a16:creationId xmlns:a16="http://schemas.microsoft.com/office/drawing/2014/main" id="{F983B56B-F4E5-4E71-9029-520CE42309AB}"/>
+                <a16:creationId xmlns:a16="http://schemas.microsoft.com/office/drawing/2014/main" xmlns="" id="{F983B56B-F4E5-4E71-9029-520CE42309AB}"/>
               </a:ext>
             </a:extLst>
           </p:cNvPr>
@@ -1998,7 +1998,7 @@
           <p:cNvPr id="5" name="Foliennummernplatzhalter 4">
             <a:extLst>
               <a:ext uri="{FF2B5EF4-FFF2-40B4-BE49-F238E27FC236}">
-                <a16:creationId xmlns:a16="http://schemas.microsoft.com/office/drawing/2014/main" id="{81BCA93A-DF00-45A9-BE1A-84ABDAEAFF5A}"/>
+                <a16:creationId xmlns:a16="http://schemas.microsoft.com/office/drawing/2014/main" xmlns="" id="{81BCA93A-DF00-45A9-BE1A-84ABDAEAFF5A}"/>
               </a:ext>
             </a:extLst>
           </p:cNvPr>
@@ -2057,7 +2057,7 @@
           <p:cNvPr id="2" name="Datumsplatzhalter 1">
             <a:extLst>
               <a:ext uri="{FF2B5EF4-FFF2-40B4-BE49-F238E27FC236}">
-                <a16:creationId xmlns:a16="http://schemas.microsoft.com/office/drawing/2014/main" id="{0E104438-7910-4513-A4FD-9E4590306EC8}"/>
+                <a16:creationId xmlns:a16="http://schemas.microsoft.com/office/drawing/2014/main" xmlns="" id="{0E104438-7910-4513-A4FD-9E4590306EC8}"/>
               </a:ext>
             </a:extLst>
           </p:cNvPr>
@@ -2075,7 +2075,7 @@
           <a:p>
             <a:fld id="{1A473A71-948F-4AE8-AF79-80443CCFF2D0}" type="datetimeFigureOut">
               <a:rPr lang="de-DE" smtClean="0"/>
-              <a:t>03.02.2020</a:t>
+              <a:t>17.02.2020</a:t>
             </a:fld>
             <a:endParaRPr lang="de-DE"/>
           </a:p>
@@ -2086,7 +2086,7 @@
           <p:cNvPr id="3" name="Fußzeilenplatzhalter 2">
             <a:extLst>
               <a:ext uri="{FF2B5EF4-FFF2-40B4-BE49-F238E27FC236}">
-                <a16:creationId xmlns:a16="http://schemas.microsoft.com/office/drawing/2014/main" id="{17F14611-BAB9-4EB1-9A5B-3055FAB8B3B4}"/>
+                <a16:creationId xmlns:a16="http://schemas.microsoft.com/office/drawing/2014/main" xmlns="" id="{17F14611-BAB9-4EB1-9A5B-3055FAB8B3B4}"/>
               </a:ext>
             </a:extLst>
           </p:cNvPr>
@@ -2111,7 +2111,7 @@
           <p:cNvPr id="4" name="Foliennummernplatzhalter 3">
             <a:extLst>
               <a:ext uri="{FF2B5EF4-FFF2-40B4-BE49-F238E27FC236}">
-                <a16:creationId xmlns:a16="http://schemas.microsoft.com/office/drawing/2014/main" id="{D52F29C2-46A5-4346-9DBD-BBC114E53C7C}"/>
+                <a16:creationId xmlns:a16="http://schemas.microsoft.com/office/drawing/2014/main" xmlns="" id="{D52F29C2-46A5-4346-9DBD-BBC114E53C7C}"/>
               </a:ext>
             </a:extLst>
           </p:cNvPr>
@@ -2170,7 +2170,7 @@
           <p:cNvPr id="2" name="Titel 1">
             <a:extLst>
               <a:ext uri="{FF2B5EF4-FFF2-40B4-BE49-F238E27FC236}">
-                <a16:creationId xmlns:a16="http://schemas.microsoft.com/office/drawing/2014/main" id="{C1BBF63F-0A9F-4C8D-B39A-1FBF393077CB}"/>
+                <a16:creationId xmlns:a16="http://schemas.microsoft.com/office/drawing/2014/main" xmlns="" id="{C1BBF63F-0A9F-4C8D-B39A-1FBF393077CB}"/>
               </a:ext>
             </a:extLst>
           </p:cNvPr>
@@ -2207,7 +2207,7 @@
           <p:cNvPr id="3" name="Inhaltsplatzhalter 2">
             <a:extLst>
               <a:ext uri="{FF2B5EF4-FFF2-40B4-BE49-F238E27FC236}">
-                <a16:creationId xmlns:a16="http://schemas.microsoft.com/office/drawing/2014/main" id="{CC0BA02F-2358-4BE3-9263-12AFB01C7440}"/>
+                <a16:creationId xmlns:a16="http://schemas.microsoft.com/office/drawing/2014/main" xmlns="" id="{CC0BA02F-2358-4BE3-9263-12AFB01C7440}"/>
               </a:ext>
             </a:extLst>
           </p:cNvPr>
@@ -2297,7 +2297,7 @@
           <p:cNvPr id="4" name="Textplatzhalter 3">
             <a:extLst>
               <a:ext uri="{FF2B5EF4-FFF2-40B4-BE49-F238E27FC236}">
-                <a16:creationId xmlns:a16="http://schemas.microsoft.com/office/drawing/2014/main" id="{6BB9EA18-FEDB-4248-80B9-8137979A1979}"/>
+                <a16:creationId xmlns:a16="http://schemas.microsoft.com/office/drawing/2014/main" xmlns="" id="{6BB9EA18-FEDB-4248-80B9-8137979A1979}"/>
               </a:ext>
             </a:extLst>
           </p:cNvPr>
@@ -2368,7 +2368,7 @@
           <p:cNvPr id="5" name="Datumsplatzhalter 4">
             <a:extLst>
               <a:ext uri="{FF2B5EF4-FFF2-40B4-BE49-F238E27FC236}">
-                <a16:creationId xmlns:a16="http://schemas.microsoft.com/office/drawing/2014/main" id="{E7BEF15C-25A5-4075-B7B6-DDD9C635AB90}"/>
+                <a16:creationId xmlns:a16="http://schemas.microsoft.com/office/drawing/2014/main" xmlns="" id="{E7BEF15C-25A5-4075-B7B6-DDD9C635AB90}"/>
               </a:ext>
             </a:extLst>
           </p:cNvPr>
@@ -2386,7 +2386,7 @@
           <a:p>
             <a:fld id="{1A473A71-948F-4AE8-AF79-80443CCFF2D0}" type="datetimeFigureOut">
               <a:rPr lang="de-DE" smtClean="0"/>
-              <a:t>03.02.2020</a:t>
+              <a:t>17.02.2020</a:t>
             </a:fld>
             <a:endParaRPr lang="de-DE"/>
           </a:p>
@@ -2397,7 +2397,7 @@
           <p:cNvPr id="6" name="Fußzeilenplatzhalter 5">
             <a:extLst>
               <a:ext uri="{FF2B5EF4-FFF2-40B4-BE49-F238E27FC236}">
-                <a16:creationId xmlns:a16="http://schemas.microsoft.com/office/drawing/2014/main" id="{C7D0D9B6-96E0-470D-82E2-37080BACE716}"/>
+                <a16:creationId xmlns:a16="http://schemas.microsoft.com/office/drawing/2014/main" xmlns="" id="{C7D0D9B6-96E0-470D-82E2-37080BACE716}"/>
               </a:ext>
             </a:extLst>
           </p:cNvPr>
@@ -2422,7 +2422,7 @@
           <p:cNvPr id="7" name="Foliennummernplatzhalter 6">
             <a:extLst>
               <a:ext uri="{FF2B5EF4-FFF2-40B4-BE49-F238E27FC236}">
-                <a16:creationId xmlns:a16="http://schemas.microsoft.com/office/drawing/2014/main" id="{1E2AAA02-713E-4FAF-9DA2-D45BB22BDF5A}"/>
+                <a16:creationId xmlns:a16="http://schemas.microsoft.com/office/drawing/2014/main" xmlns="" id="{1E2AAA02-713E-4FAF-9DA2-D45BB22BDF5A}"/>
               </a:ext>
             </a:extLst>
           </p:cNvPr>
@@ -2481,7 +2481,7 @@
           <p:cNvPr id="2" name="Titel 1">
             <a:extLst>
               <a:ext uri="{FF2B5EF4-FFF2-40B4-BE49-F238E27FC236}">
-                <a16:creationId xmlns:a16="http://schemas.microsoft.com/office/drawing/2014/main" id="{5BFB5D39-2519-429E-BCE6-6431ECAB345B}"/>
+                <a16:creationId xmlns:a16="http://schemas.microsoft.com/office/drawing/2014/main" xmlns="" id="{5BFB5D39-2519-429E-BCE6-6431ECAB345B}"/>
               </a:ext>
             </a:extLst>
           </p:cNvPr>
@@ -2518,7 +2518,7 @@
           <p:cNvPr id="3" name="Bildplatzhalter 2">
             <a:extLst>
               <a:ext uri="{FF2B5EF4-FFF2-40B4-BE49-F238E27FC236}">
-                <a16:creationId xmlns:a16="http://schemas.microsoft.com/office/drawing/2014/main" id="{1FD63C97-E3C2-4D42-90CB-C724C06D50A3}"/>
+                <a16:creationId xmlns:a16="http://schemas.microsoft.com/office/drawing/2014/main" xmlns="" id="{1FD63C97-E3C2-4D42-90CB-C724C06D50A3}"/>
               </a:ext>
             </a:extLst>
           </p:cNvPr>
@@ -2585,7 +2585,7 @@
           <p:cNvPr id="4" name="Textplatzhalter 3">
             <a:extLst>
               <a:ext uri="{FF2B5EF4-FFF2-40B4-BE49-F238E27FC236}">
-                <a16:creationId xmlns:a16="http://schemas.microsoft.com/office/drawing/2014/main" id="{FD916F31-6E71-442A-9EBC-EE6BFB374565}"/>
+                <a16:creationId xmlns:a16="http://schemas.microsoft.com/office/drawing/2014/main" xmlns="" id="{FD916F31-6E71-442A-9EBC-EE6BFB374565}"/>
               </a:ext>
             </a:extLst>
           </p:cNvPr>
@@ -2656,7 +2656,7 @@
           <p:cNvPr id="5" name="Datumsplatzhalter 4">
             <a:extLst>
               <a:ext uri="{FF2B5EF4-FFF2-40B4-BE49-F238E27FC236}">
-                <a16:creationId xmlns:a16="http://schemas.microsoft.com/office/drawing/2014/main" id="{5DB9302E-5D7A-482C-B7F5-74F2C77D9D20}"/>
+                <a16:creationId xmlns:a16="http://schemas.microsoft.com/office/drawing/2014/main" xmlns="" id="{5DB9302E-5D7A-482C-B7F5-74F2C77D9D20}"/>
               </a:ext>
             </a:extLst>
           </p:cNvPr>
@@ -2674,7 +2674,7 @@
           <a:p>
             <a:fld id="{1A473A71-948F-4AE8-AF79-80443CCFF2D0}" type="datetimeFigureOut">
               <a:rPr lang="de-DE" smtClean="0"/>
-              <a:t>03.02.2020</a:t>
+              <a:t>17.02.2020</a:t>
             </a:fld>
             <a:endParaRPr lang="de-DE"/>
           </a:p>
@@ -2685,7 +2685,7 @@
           <p:cNvPr id="6" name="Fußzeilenplatzhalter 5">
             <a:extLst>
               <a:ext uri="{FF2B5EF4-FFF2-40B4-BE49-F238E27FC236}">
-                <a16:creationId xmlns:a16="http://schemas.microsoft.com/office/drawing/2014/main" id="{C150407C-9396-4D0B-8570-ED95DD30979A}"/>
+                <a16:creationId xmlns:a16="http://schemas.microsoft.com/office/drawing/2014/main" xmlns="" id="{C150407C-9396-4D0B-8570-ED95DD30979A}"/>
               </a:ext>
             </a:extLst>
           </p:cNvPr>
@@ -2710,7 +2710,7 @@
           <p:cNvPr id="7" name="Foliennummernplatzhalter 6">
             <a:extLst>
               <a:ext uri="{FF2B5EF4-FFF2-40B4-BE49-F238E27FC236}">
-                <a16:creationId xmlns:a16="http://schemas.microsoft.com/office/drawing/2014/main" id="{9448B357-7506-45AC-9B90-BA7CE7781D5A}"/>
+                <a16:creationId xmlns:a16="http://schemas.microsoft.com/office/drawing/2014/main" xmlns="" id="{9448B357-7506-45AC-9B90-BA7CE7781D5A}"/>
               </a:ext>
             </a:extLst>
           </p:cNvPr>
@@ -2774,7 +2774,7 @@
           <p:cNvPr id="2" name="Titelplatzhalter 1">
             <a:extLst>
               <a:ext uri="{FF2B5EF4-FFF2-40B4-BE49-F238E27FC236}">
-                <a16:creationId xmlns:a16="http://schemas.microsoft.com/office/drawing/2014/main" id="{9FA877A1-6E5C-4773-87C2-8ACD351CF551}"/>
+                <a16:creationId xmlns:a16="http://schemas.microsoft.com/office/drawing/2014/main" xmlns="" id="{9FA877A1-6E5C-4773-87C2-8ACD351CF551}"/>
               </a:ext>
             </a:extLst>
           </p:cNvPr>
@@ -2812,7 +2812,7 @@
           <p:cNvPr id="3" name="Textplatzhalter 2">
             <a:extLst>
               <a:ext uri="{FF2B5EF4-FFF2-40B4-BE49-F238E27FC236}">
-                <a16:creationId xmlns:a16="http://schemas.microsoft.com/office/drawing/2014/main" id="{C112C717-CE3E-4B70-9323-4EF3D016BE6E}"/>
+                <a16:creationId xmlns:a16="http://schemas.microsoft.com/office/drawing/2014/main" xmlns="" id="{C112C717-CE3E-4B70-9323-4EF3D016BE6E}"/>
               </a:ext>
             </a:extLst>
           </p:cNvPr>
@@ -2879,7 +2879,7 @@
           <p:cNvPr id="4" name="Datumsplatzhalter 3">
             <a:extLst>
               <a:ext uri="{FF2B5EF4-FFF2-40B4-BE49-F238E27FC236}">
-                <a16:creationId xmlns:a16="http://schemas.microsoft.com/office/drawing/2014/main" id="{A4A9F7DC-057C-461A-96C3-5E7DCD8A44AB}"/>
+                <a16:creationId xmlns:a16="http://schemas.microsoft.com/office/drawing/2014/main" xmlns="" id="{A4A9F7DC-057C-461A-96C3-5E7DCD8A44AB}"/>
               </a:ext>
             </a:extLst>
           </p:cNvPr>
@@ -2915,7 +2915,7 @@
           <a:p>
             <a:fld id="{1A473A71-948F-4AE8-AF79-80443CCFF2D0}" type="datetimeFigureOut">
               <a:rPr lang="de-DE" smtClean="0"/>
-              <a:t>03.02.2020</a:t>
+              <a:t>17.02.2020</a:t>
             </a:fld>
             <a:endParaRPr lang="de-DE"/>
           </a:p>
@@ -2926,7 +2926,7 @@
           <p:cNvPr id="5" name="Fußzeilenplatzhalter 4">
             <a:extLst>
               <a:ext uri="{FF2B5EF4-FFF2-40B4-BE49-F238E27FC236}">
-                <a16:creationId xmlns:a16="http://schemas.microsoft.com/office/drawing/2014/main" id="{8FCC5EDA-E7B3-4E4C-A67D-00B6563032AC}"/>
+                <a16:creationId xmlns:a16="http://schemas.microsoft.com/office/drawing/2014/main" xmlns="" id="{8FCC5EDA-E7B3-4E4C-A67D-00B6563032AC}"/>
               </a:ext>
             </a:extLst>
           </p:cNvPr>
@@ -2969,7 +2969,7 @@
           <p:cNvPr id="6" name="Foliennummernplatzhalter 5">
             <a:extLst>
               <a:ext uri="{FF2B5EF4-FFF2-40B4-BE49-F238E27FC236}">
-                <a16:creationId xmlns:a16="http://schemas.microsoft.com/office/drawing/2014/main" id="{3197C0FD-ED17-4341-8625-38DDB48F61B7}"/>
+                <a16:creationId xmlns:a16="http://schemas.microsoft.com/office/drawing/2014/main" xmlns="" id="{3197C0FD-ED17-4341-8625-38DDB48F61B7}"/>
               </a:ext>
             </a:extLst>
           </p:cNvPr>
@@ -3337,7 +3337,7 @@
           <p:cNvPr id="2" name="Titel 1">
             <a:extLst>
               <a:ext uri="{FF2B5EF4-FFF2-40B4-BE49-F238E27FC236}">
-                <a16:creationId xmlns:a16="http://schemas.microsoft.com/office/drawing/2014/main" id="{2121EE81-C787-40A4-9746-C94978F7F541}"/>
+                <a16:creationId xmlns:a16="http://schemas.microsoft.com/office/drawing/2014/main" xmlns="" id="{2121EE81-C787-40A4-9746-C94978F7F541}"/>
               </a:ext>
             </a:extLst>
           </p:cNvPr>
@@ -3362,7 +3362,7 @@
           <p:cNvPr id="3" name="Untertitel 2">
             <a:extLst>
               <a:ext uri="{FF2B5EF4-FFF2-40B4-BE49-F238E27FC236}">
-                <a16:creationId xmlns:a16="http://schemas.microsoft.com/office/drawing/2014/main" id="{01DE6B12-0540-4420-9A5E-70C062DEC222}"/>
+                <a16:creationId xmlns:a16="http://schemas.microsoft.com/office/drawing/2014/main" xmlns="" id="{01DE6B12-0540-4420-9A5E-70C062DEC222}"/>
               </a:ext>
             </a:extLst>
           </p:cNvPr>
@@ -3417,7 +3417,7 @@
           <p:cNvPr id="2" name="Rechteck 1">
             <a:extLst>
               <a:ext uri="{FF2B5EF4-FFF2-40B4-BE49-F238E27FC236}">
-                <a16:creationId xmlns:a16="http://schemas.microsoft.com/office/drawing/2014/main" id="{D144D94C-2289-4013-A9D0-E50B76235F78}"/>
+                <a16:creationId xmlns:a16="http://schemas.microsoft.com/office/drawing/2014/main" xmlns="" id="{D144D94C-2289-4013-A9D0-E50B76235F78}"/>
               </a:ext>
             </a:extLst>
           </p:cNvPr>
@@ -3469,7 +3469,7 @@
           <p:cNvPr id="4" name="Gerade Verbindung mit Pfeil 3">
             <a:extLst>
               <a:ext uri="{FF2B5EF4-FFF2-40B4-BE49-F238E27FC236}">
-                <a16:creationId xmlns:a16="http://schemas.microsoft.com/office/drawing/2014/main" id="{4505AB64-DC1C-4AEE-AD57-F2CA0E3FA2E9}"/>
+                <a16:creationId xmlns:a16="http://schemas.microsoft.com/office/drawing/2014/main" xmlns="" id="{4505AB64-DC1C-4AEE-AD57-F2CA0E3FA2E9}"/>
               </a:ext>
             </a:extLst>
           </p:cNvPr>
@@ -3513,7 +3513,7 @@
           <p:cNvPr id="8" name="Gerade Verbindung mit Pfeil 7">
             <a:extLst>
               <a:ext uri="{FF2B5EF4-FFF2-40B4-BE49-F238E27FC236}">
-                <a16:creationId xmlns:a16="http://schemas.microsoft.com/office/drawing/2014/main" id="{B5B15429-6E3F-4F11-BD32-07D58259D622}"/>
+                <a16:creationId xmlns:a16="http://schemas.microsoft.com/office/drawing/2014/main" xmlns="" id="{B5B15429-6E3F-4F11-BD32-07D58259D622}"/>
               </a:ext>
             </a:extLst>
           </p:cNvPr>
@@ -3557,7 +3557,7 @@
           <p:cNvPr id="16" name="Gerade Verbindung mit Pfeil 15">
             <a:extLst>
               <a:ext uri="{FF2B5EF4-FFF2-40B4-BE49-F238E27FC236}">
-                <a16:creationId xmlns:a16="http://schemas.microsoft.com/office/drawing/2014/main" id="{B1487A4C-D5C8-449F-A12B-5A5CAA93DE59}"/>
+                <a16:creationId xmlns:a16="http://schemas.microsoft.com/office/drawing/2014/main" xmlns="" id="{B1487A4C-D5C8-449F-A12B-5A5CAA93DE59}"/>
               </a:ext>
             </a:extLst>
           </p:cNvPr>
@@ -3599,7 +3599,7 @@
           <p:cNvPr id="18" name="Gerade Verbindung mit Pfeil 17">
             <a:extLst>
               <a:ext uri="{FF2B5EF4-FFF2-40B4-BE49-F238E27FC236}">
-                <a16:creationId xmlns:a16="http://schemas.microsoft.com/office/drawing/2014/main" id="{EFAA1BE7-4B70-4DAF-802D-BCB4141E7E5F}"/>
+                <a16:creationId xmlns:a16="http://schemas.microsoft.com/office/drawing/2014/main" xmlns="" id="{EFAA1BE7-4B70-4DAF-802D-BCB4141E7E5F}"/>
               </a:ext>
             </a:extLst>
           </p:cNvPr>
@@ -3641,7 +3641,7 @@
           <p:cNvPr id="20" name="Gerade Verbindung mit Pfeil 19">
             <a:extLst>
               <a:ext uri="{FF2B5EF4-FFF2-40B4-BE49-F238E27FC236}">
-                <a16:creationId xmlns:a16="http://schemas.microsoft.com/office/drawing/2014/main" id="{7ACA4C1C-ECE5-44D0-9F38-2282B9102AF8}"/>
+                <a16:creationId xmlns:a16="http://schemas.microsoft.com/office/drawing/2014/main" xmlns="" id="{7ACA4C1C-ECE5-44D0-9F38-2282B9102AF8}"/>
               </a:ext>
             </a:extLst>
           </p:cNvPr>
@@ -3683,7 +3683,7 @@
           <p:cNvPr id="5" name="Gruppieren 4">
             <a:extLst>
               <a:ext uri="{FF2B5EF4-FFF2-40B4-BE49-F238E27FC236}">
-                <a16:creationId xmlns:a16="http://schemas.microsoft.com/office/drawing/2014/main" id="{BCFB85C1-C4B1-4E5E-A3BB-FA9706001FA8}"/>
+                <a16:creationId xmlns:a16="http://schemas.microsoft.com/office/drawing/2014/main" xmlns="" id="{BCFB85C1-C4B1-4E5E-A3BB-FA9706001FA8}"/>
               </a:ext>
             </a:extLst>
           </p:cNvPr>
@@ -3703,7 +3703,7 @@
             <p:cNvPr id="3" name="Gruppieren 2">
               <a:extLst>
                 <a:ext uri="{FF2B5EF4-FFF2-40B4-BE49-F238E27FC236}">
-                  <a16:creationId xmlns:a16="http://schemas.microsoft.com/office/drawing/2014/main" id="{154378B4-0281-4001-908D-1C186E31E567}"/>
+                  <a16:creationId xmlns:a16="http://schemas.microsoft.com/office/drawing/2014/main" xmlns="" id="{154378B4-0281-4001-908D-1C186E31E567}"/>
                 </a:ext>
               </a:extLst>
             </p:cNvPr>
@@ -3723,7 +3723,7 @@
               <p:cNvPr id="24" name="Gerade Verbindung mit Pfeil 23">
                 <a:extLst>
                   <a:ext uri="{FF2B5EF4-FFF2-40B4-BE49-F238E27FC236}">
-                    <a16:creationId xmlns:a16="http://schemas.microsoft.com/office/drawing/2014/main" id="{310442C6-9E91-4C86-A911-88EF52519BA8}"/>
+                    <a16:creationId xmlns:a16="http://schemas.microsoft.com/office/drawing/2014/main" xmlns="" id="{310442C6-9E91-4C86-A911-88EF52519BA8}"/>
                   </a:ext>
                 </a:extLst>
               </p:cNvPr>
@@ -3762,7 +3762,7 @@
               <p:cNvPr id="26" name="Gerade Verbindung mit Pfeil 25">
                 <a:extLst>
                   <a:ext uri="{FF2B5EF4-FFF2-40B4-BE49-F238E27FC236}">
-                    <a16:creationId xmlns:a16="http://schemas.microsoft.com/office/drawing/2014/main" id="{410FEC98-82F4-4707-84F3-E2A3A8FD521B}"/>
+                    <a16:creationId xmlns:a16="http://schemas.microsoft.com/office/drawing/2014/main" xmlns="" id="{410FEC98-82F4-4707-84F3-E2A3A8FD521B}"/>
                   </a:ext>
                 </a:extLst>
               </p:cNvPr>
@@ -3803,7 +3803,7 @@
               <p:cNvPr id="28" name="Textfeld 27">
                 <a:extLst>
                   <a:ext uri="{FF2B5EF4-FFF2-40B4-BE49-F238E27FC236}">
-                    <a16:creationId xmlns:a16="http://schemas.microsoft.com/office/drawing/2014/main" id="{18DD6999-5CFE-4405-B945-25C14D02FEF5}"/>
+                    <a16:creationId xmlns:a16="http://schemas.microsoft.com/office/drawing/2014/main" xmlns="" id="{18DD6999-5CFE-4405-B945-25C14D02FEF5}"/>
                   </a:ext>
                 </a:extLst>
               </p:cNvPr>
@@ -3839,7 +3839,7 @@
             <p:cNvPr id="29" name="Textfeld 28">
               <a:extLst>
                 <a:ext uri="{FF2B5EF4-FFF2-40B4-BE49-F238E27FC236}">
-                  <a16:creationId xmlns:a16="http://schemas.microsoft.com/office/drawing/2014/main" id="{72E3181E-BA35-4B43-8E82-5492F61E06FB}"/>
+                  <a16:creationId xmlns:a16="http://schemas.microsoft.com/office/drawing/2014/main" xmlns="" id="{72E3181E-BA35-4B43-8E82-5492F61E06FB}"/>
                 </a:ext>
               </a:extLst>
             </p:cNvPr>
@@ -3875,7 +3875,7 @@
           <p:cNvPr id="30" name="Textfeld 29">
             <a:extLst>
               <a:ext uri="{FF2B5EF4-FFF2-40B4-BE49-F238E27FC236}">
-                <a16:creationId xmlns:a16="http://schemas.microsoft.com/office/drawing/2014/main" id="{9B4D3990-7E7B-4EAE-ABDF-87D303B99CB3}"/>
+                <a16:creationId xmlns:a16="http://schemas.microsoft.com/office/drawing/2014/main" xmlns="" id="{9B4D3990-7E7B-4EAE-ABDF-87D303B99CB3}"/>
               </a:ext>
             </a:extLst>
           </p:cNvPr>
@@ -3914,7 +3914,7 @@
           <p:cNvPr id="31" name="Textfeld 30">
             <a:extLst>
               <a:ext uri="{FF2B5EF4-FFF2-40B4-BE49-F238E27FC236}">
-                <a16:creationId xmlns:a16="http://schemas.microsoft.com/office/drawing/2014/main" id="{0E3472A2-C2A7-48F3-A218-B7D8ECF2FE50}"/>
+                <a16:creationId xmlns:a16="http://schemas.microsoft.com/office/drawing/2014/main" xmlns="" id="{0E3472A2-C2A7-48F3-A218-B7D8ECF2FE50}"/>
               </a:ext>
             </a:extLst>
           </p:cNvPr>
@@ -3953,7 +3953,7 @@
           <p:cNvPr id="32" name="Textfeld 31">
             <a:extLst>
               <a:ext uri="{FF2B5EF4-FFF2-40B4-BE49-F238E27FC236}">
-                <a16:creationId xmlns:a16="http://schemas.microsoft.com/office/drawing/2014/main" id="{6FB5C9B1-05AD-42F6-8D07-F962E1DBBC09}"/>
+                <a16:creationId xmlns:a16="http://schemas.microsoft.com/office/drawing/2014/main" xmlns="" id="{6FB5C9B1-05AD-42F6-8D07-F962E1DBBC09}"/>
               </a:ext>
             </a:extLst>
           </p:cNvPr>
@@ -3992,7 +3992,7 @@
           <p:cNvPr id="34" name="Textfeld 33">
             <a:extLst>
               <a:ext uri="{FF2B5EF4-FFF2-40B4-BE49-F238E27FC236}">
-                <a16:creationId xmlns:a16="http://schemas.microsoft.com/office/drawing/2014/main" id="{BF4B2FAD-B656-4F08-B9E4-344801DB9BC4}"/>
+                <a16:creationId xmlns:a16="http://schemas.microsoft.com/office/drawing/2014/main" xmlns="" id="{BF4B2FAD-B656-4F08-B9E4-344801DB9BC4}"/>
               </a:ext>
             </a:extLst>
           </p:cNvPr>
@@ -4041,7 +4041,7 @@
           <p:cNvPr id="35" name="Textfeld 34">
             <a:extLst>
               <a:ext uri="{FF2B5EF4-FFF2-40B4-BE49-F238E27FC236}">
-                <a16:creationId xmlns:a16="http://schemas.microsoft.com/office/drawing/2014/main" id="{865E304E-5C43-45D5-9D95-071105971C78}"/>
+                <a16:creationId xmlns:a16="http://schemas.microsoft.com/office/drawing/2014/main" xmlns="" id="{865E304E-5C43-45D5-9D95-071105971C78}"/>
               </a:ext>
             </a:extLst>
           </p:cNvPr>
@@ -4086,7 +4086,7 @@
           <p:cNvPr id="10" name="Gerade Verbindung mit Pfeil 9">
             <a:extLst>
               <a:ext uri="{FF2B5EF4-FFF2-40B4-BE49-F238E27FC236}">
-                <a16:creationId xmlns:a16="http://schemas.microsoft.com/office/drawing/2014/main" id="{096441BA-10BC-4E6B-A8CE-7C308E190311}"/>
+                <a16:creationId xmlns:a16="http://schemas.microsoft.com/office/drawing/2014/main" xmlns="" id="{096441BA-10BC-4E6B-A8CE-7C308E190311}"/>
               </a:ext>
             </a:extLst>
           </p:cNvPr>
@@ -4130,7 +4130,7 @@
           <p:cNvPr id="37" name="Textfeld 36">
             <a:extLst>
               <a:ext uri="{FF2B5EF4-FFF2-40B4-BE49-F238E27FC236}">
-                <a16:creationId xmlns:a16="http://schemas.microsoft.com/office/drawing/2014/main" id="{7E1C5C5F-9B91-48A4-93FF-0F95B1D00285}"/>
+                <a16:creationId xmlns:a16="http://schemas.microsoft.com/office/drawing/2014/main" xmlns="" id="{7E1C5C5F-9B91-48A4-93FF-0F95B1D00285}"/>
               </a:ext>
             </a:extLst>
           </p:cNvPr>
@@ -4175,7 +4175,7 @@
           <p:cNvPr id="11" name="Gerade Verbindung mit Pfeil 10">
             <a:extLst>
               <a:ext uri="{FF2B5EF4-FFF2-40B4-BE49-F238E27FC236}">
-                <a16:creationId xmlns:a16="http://schemas.microsoft.com/office/drawing/2014/main" id="{D44F33DC-7A48-45C8-BFAD-B0E912C6822E}"/>
+                <a16:creationId xmlns:a16="http://schemas.microsoft.com/office/drawing/2014/main" xmlns="" id="{D44F33DC-7A48-45C8-BFAD-B0E912C6822E}"/>
               </a:ext>
             </a:extLst>
           </p:cNvPr>
@@ -4219,7 +4219,7 @@
           <p:cNvPr id="38" name="Textfeld 37">
             <a:extLst>
               <a:ext uri="{FF2B5EF4-FFF2-40B4-BE49-F238E27FC236}">
-                <a16:creationId xmlns:a16="http://schemas.microsoft.com/office/drawing/2014/main" id="{C1555B31-4C6F-4514-9994-54536E4FE13B}"/>
+                <a16:creationId xmlns:a16="http://schemas.microsoft.com/office/drawing/2014/main" xmlns="" id="{C1555B31-4C6F-4514-9994-54536E4FE13B}"/>
               </a:ext>
             </a:extLst>
           </p:cNvPr>
@@ -4268,7 +4268,7 @@
           <p:cNvPr id="40" name="Gerader Verbinder 39">
             <a:extLst>
               <a:ext uri="{FF2B5EF4-FFF2-40B4-BE49-F238E27FC236}">
-                <a16:creationId xmlns:a16="http://schemas.microsoft.com/office/drawing/2014/main" id="{8EF695A0-2CBC-4393-A369-3119AB7B7113}"/>
+                <a16:creationId xmlns:a16="http://schemas.microsoft.com/office/drawing/2014/main" xmlns="" id="{8EF695A0-2CBC-4393-A369-3119AB7B7113}"/>
               </a:ext>
             </a:extLst>
           </p:cNvPr>
@@ -4339,7 +4339,7 @@
           <p:cNvPr id="2" name="Ellipse 1">
             <a:extLst>
               <a:ext uri="{FF2B5EF4-FFF2-40B4-BE49-F238E27FC236}">
-                <a16:creationId xmlns:a16="http://schemas.microsoft.com/office/drawing/2014/main" id="{2B3ACD3A-7C75-4673-944A-464045A0E9AF}"/>
+                <a16:creationId xmlns:a16="http://schemas.microsoft.com/office/drawing/2014/main" xmlns="" id="{2B3ACD3A-7C75-4673-944A-464045A0E9AF}"/>
               </a:ext>
             </a:extLst>
           </p:cNvPr>
@@ -4391,7 +4391,7 @@
           <p:cNvPr id="3" name="Ellipse 2">
             <a:extLst>
               <a:ext uri="{FF2B5EF4-FFF2-40B4-BE49-F238E27FC236}">
-                <a16:creationId xmlns:a16="http://schemas.microsoft.com/office/drawing/2014/main" id="{53536759-76CE-456C-8E16-C111C37F543C}"/>
+                <a16:creationId xmlns:a16="http://schemas.microsoft.com/office/drawing/2014/main" xmlns="" id="{53536759-76CE-456C-8E16-C111C37F543C}"/>
               </a:ext>
             </a:extLst>
           </p:cNvPr>
@@ -4443,7 +4443,7 @@
           <p:cNvPr id="5" name="Gerade Verbindung mit Pfeil 4">
             <a:extLst>
               <a:ext uri="{FF2B5EF4-FFF2-40B4-BE49-F238E27FC236}">
-                <a16:creationId xmlns:a16="http://schemas.microsoft.com/office/drawing/2014/main" id="{47DE6D7F-60A5-4A28-A8CA-E13D0B9C2E93}"/>
+                <a16:creationId xmlns:a16="http://schemas.microsoft.com/office/drawing/2014/main" xmlns="" id="{47DE6D7F-60A5-4A28-A8CA-E13D0B9C2E93}"/>
               </a:ext>
             </a:extLst>
           </p:cNvPr>
@@ -4487,7 +4487,7 @@
           <p:cNvPr id="6" name="Gerade Verbindung mit Pfeil 5">
             <a:extLst>
               <a:ext uri="{FF2B5EF4-FFF2-40B4-BE49-F238E27FC236}">
-                <a16:creationId xmlns:a16="http://schemas.microsoft.com/office/drawing/2014/main" id="{E56190AA-57A3-466B-ABA5-709E934C055F}"/>
+                <a16:creationId xmlns:a16="http://schemas.microsoft.com/office/drawing/2014/main" xmlns="" id="{E56190AA-57A3-466B-ABA5-709E934C055F}"/>
               </a:ext>
             </a:extLst>
           </p:cNvPr>
@@ -4531,7 +4531,7 @@
           <p:cNvPr id="8" name="Gerade Verbindung mit Pfeil 7">
             <a:extLst>
               <a:ext uri="{FF2B5EF4-FFF2-40B4-BE49-F238E27FC236}">
-                <a16:creationId xmlns:a16="http://schemas.microsoft.com/office/drawing/2014/main" id="{D0AD2803-AA4F-431C-893E-AB6D0ECAAAED}"/>
+                <a16:creationId xmlns:a16="http://schemas.microsoft.com/office/drawing/2014/main" xmlns="" id="{D0AD2803-AA4F-431C-893E-AB6D0ECAAAED}"/>
               </a:ext>
             </a:extLst>
           </p:cNvPr>
@@ -4576,7 +4576,7 @@
           <p:cNvPr id="12" name="Gerader Verbinder 11">
             <a:extLst>
               <a:ext uri="{FF2B5EF4-FFF2-40B4-BE49-F238E27FC236}">
-                <a16:creationId xmlns:a16="http://schemas.microsoft.com/office/drawing/2014/main" id="{E42A6C69-946F-4FFD-942F-6C5F21981703}"/>
+                <a16:creationId xmlns:a16="http://schemas.microsoft.com/office/drawing/2014/main" xmlns="" id="{E42A6C69-946F-4FFD-942F-6C5F21981703}"/>
               </a:ext>
             </a:extLst>
           </p:cNvPr>
@@ -4617,7 +4617,7 @@
           <p:cNvPr id="13" name="Gerader Verbinder 12">
             <a:extLst>
               <a:ext uri="{FF2B5EF4-FFF2-40B4-BE49-F238E27FC236}">
-                <a16:creationId xmlns:a16="http://schemas.microsoft.com/office/drawing/2014/main" id="{71EC7A47-248B-4A5E-A452-1D16387AE183}"/>
+                <a16:creationId xmlns:a16="http://schemas.microsoft.com/office/drawing/2014/main" xmlns="" id="{71EC7A47-248B-4A5E-A452-1D16387AE183}"/>
               </a:ext>
             </a:extLst>
           </p:cNvPr>
@@ -4660,7 +4660,7 @@
           <p:cNvPr id="15" name="Gerade Verbindung mit Pfeil 14">
             <a:extLst>
               <a:ext uri="{FF2B5EF4-FFF2-40B4-BE49-F238E27FC236}">
-                <a16:creationId xmlns:a16="http://schemas.microsoft.com/office/drawing/2014/main" id="{3DAEC6A3-86E3-4BC5-830E-8D3330CB90A6}"/>
+                <a16:creationId xmlns:a16="http://schemas.microsoft.com/office/drawing/2014/main" xmlns="" id="{3DAEC6A3-86E3-4BC5-830E-8D3330CB90A6}"/>
               </a:ext>
             </a:extLst>
           </p:cNvPr>
@@ -4703,7 +4703,7 @@
           <p:cNvPr id="16" name="Gerade Verbindung mit Pfeil 15">
             <a:extLst>
               <a:ext uri="{FF2B5EF4-FFF2-40B4-BE49-F238E27FC236}">
-                <a16:creationId xmlns:a16="http://schemas.microsoft.com/office/drawing/2014/main" id="{4FECAB05-93A6-4FAD-B0D7-3708DE4F1397}"/>
+                <a16:creationId xmlns:a16="http://schemas.microsoft.com/office/drawing/2014/main" xmlns="" id="{4FECAB05-93A6-4FAD-B0D7-3708DE4F1397}"/>
               </a:ext>
             </a:extLst>
           </p:cNvPr>
@@ -4746,7 +4746,7 @@
           <p:cNvPr id="21" name="Textfeld 20">
             <a:extLst>
               <a:ext uri="{FF2B5EF4-FFF2-40B4-BE49-F238E27FC236}">
-                <a16:creationId xmlns:a16="http://schemas.microsoft.com/office/drawing/2014/main" id="{90D1998D-B975-45E4-A3D8-67E1E223A28E}"/>
+                <a16:creationId xmlns:a16="http://schemas.microsoft.com/office/drawing/2014/main" xmlns="" id="{90D1998D-B975-45E4-A3D8-67E1E223A28E}"/>
               </a:ext>
             </a:extLst>
           </p:cNvPr>
@@ -4791,7 +4791,7 @@
           <p:cNvPr id="22" name="Textfeld 21">
             <a:extLst>
               <a:ext uri="{FF2B5EF4-FFF2-40B4-BE49-F238E27FC236}">
-                <a16:creationId xmlns:a16="http://schemas.microsoft.com/office/drawing/2014/main" id="{A527E15E-7A50-4642-A23F-988D1703218F}"/>
+                <a16:creationId xmlns:a16="http://schemas.microsoft.com/office/drawing/2014/main" xmlns="" id="{A527E15E-7A50-4642-A23F-988D1703218F}"/>
               </a:ext>
             </a:extLst>
           </p:cNvPr>
@@ -4836,7 +4836,7 @@
           <p:cNvPr id="23" name="Textfeld 22">
             <a:extLst>
               <a:ext uri="{FF2B5EF4-FFF2-40B4-BE49-F238E27FC236}">
-                <a16:creationId xmlns:a16="http://schemas.microsoft.com/office/drawing/2014/main" id="{A1E35C4E-9E89-4A1F-80E8-48F080D11BD8}"/>
+                <a16:creationId xmlns:a16="http://schemas.microsoft.com/office/drawing/2014/main" xmlns="" id="{A1E35C4E-9E89-4A1F-80E8-48F080D11BD8}"/>
               </a:ext>
             </a:extLst>
           </p:cNvPr>
@@ -4881,7 +4881,7 @@
           <p:cNvPr id="28" name="Gruppieren 27">
             <a:extLst>
               <a:ext uri="{FF2B5EF4-FFF2-40B4-BE49-F238E27FC236}">
-                <a16:creationId xmlns:a16="http://schemas.microsoft.com/office/drawing/2014/main" id="{627D707D-EE17-4959-9DE0-EDA36C99C0F0}"/>
+                <a16:creationId xmlns:a16="http://schemas.microsoft.com/office/drawing/2014/main" xmlns="" id="{627D707D-EE17-4959-9DE0-EDA36C99C0F0}"/>
               </a:ext>
             </a:extLst>
           </p:cNvPr>
@@ -4901,7 +4901,7 @@
             <p:cNvPr id="29" name="Gruppieren 28">
               <a:extLst>
                 <a:ext uri="{FF2B5EF4-FFF2-40B4-BE49-F238E27FC236}">
-                  <a16:creationId xmlns:a16="http://schemas.microsoft.com/office/drawing/2014/main" id="{F10D999F-9D1B-4971-BF1E-F303864FBA23}"/>
+                  <a16:creationId xmlns:a16="http://schemas.microsoft.com/office/drawing/2014/main" xmlns="" id="{F10D999F-9D1B-4971-BF1E-F303864FBA23}"/>
                 </a:ext>
               </a:extLst>
             </p:cNvPr>
@@ -4921,7 +4921,7 @@
               <p:cNvPr id="31" name="Gerade Verbindung mit Pfeil 30">
                 <a:extLst>
                   <a:ext uri="{FF2B5EF4-FFF2-40B4-BE49-F238E27FC236}">
-                    <a16:creationId xmlns:a16="http://schemas.microsoft.com/office/drawing/2014/main" id="{0CA818D9-7792-44C7-B6BA-A8E9C6A59404}"/>
+                    <a16:creationId xmlns:a16="http://schemas.microsoft.com/office/drawing/2014/main" xmlns="" id="{0CA818D9-7792-44C7-B6BA-A8E9C6A59404}"/>
                   </a:ext>
                 </a:extLst>
               </p:cNvPr>
@@ -4960,7 +4960,7 @@
               <p:cNvPr id="32" name="Gerade Verbindung mit Pfeil 31">
                 <a:extLst>
                   <a:ext uri="{FF2B5EF4-FFF2-40B4-BE49-F238E27FC236}">
-                    <a16:creationId xmlns:a16="http://schemas.microsoft.com/office/drawing/2014/main" id="{591FF2FB-363C-43E2-B972-B00AFB655C94}"/>
+                    <a16:creationId xmlns:a16="http://schemas.microsoft.com/office/drawing/2014/main" xmlns="" id="{591FF2FB-363C-43E2-B972-B00AFB655C94}"/>
                   </a:ext>
                 </a:extLst>
               </p:cNvPr>
@@ -5001,7 +5001,7 @@
               <p:cNvPr id="33" name="Textfeld 32">
                 <a:extLst>
                   <a:ext uri="{FF2B5EF4-FFF2-40B4-BE49-F238E27FC236}">
-                    <a16:creationId xmlns:a16="http://schemas.microsoft.com/office/drawing/2014/main" id="{BFD13965-230B-47AB-A7BB-FB4677A5F30F}"/>
+                    <a16:creationId xmlns:a16="http://schemas.microsoft.com/office/drawing/2014/main" xmlns="" id="{BFD13965-230B-47AB-A7BB-FB4677A5F30F}"/>
                   </a:ext>
                 </a:extLst>
               </p:cNvPr>
@@ -5037,7 +5037,7 @@
             <p:cNvPr id="30" name="Textfeld 29">
               <a:extLst>
                 <a:ext uri="{FF2B5EF4-FFF2-40B4-BE49-F238E27FC236}">
-                  <a16:creationId xmlns:a16="http://schemas.microsoft.com/office/drawing/2014/main" id="{FDEA4E00-D078-48D8-B9EF-559DCA3C9643}"/>
+                  <a16:creationId xmlns:a16="http://schemas.microsoft.com/office/drawing/2014/main" xmlns="" id="{FDEA4E00-D078-48D8-B9EF-559DCA3C9643}"/>
                 </a:ext>
               </a:extLst>
             </p:cNvPr>
@@ -5073,7 +5073,7 @@
           <p:cNvPr id="34" name="Textfeld 33">
             <a:extLst>
               <a:ext uri="{FF2B5EF4-FFF2-40B4-BE49-F238E27FC236}">
-                <a16:creationId xmlns:a16="http://schemas.microsoft.com/office/drawing/2014/main" id="{743DA5BB-4582-4BDE-B8F0-C6CB03A17BE2}"/>
+                <a16:creationId xmlns:a16="http://schemas.microsoft.com/office/drawing/2014/main" xmlns="" id="{743DA5BB-4582-4BDE-B8F0-C6CB03A17BE2}"/>
               </a:ext>
             </a:extLst>
           </p:cNvPr>
@@ -5111,7 +5111,7 @@
           <p:cNvPr id="35" name="Textfeld 34">
             <a:extLst>
               <a:ext uri="{FF2B5EF4-FFF2-40B4-BE49-F238E27FC236}">
-                <a16:creationId xmlns:a16="http://schemas.microsoft.com/office/drawing/2014/main" id="{04715C11-605F-4B8F-81A6-8B5B738C3050}"/>
+                <a16:creationId xmlns:a16="http://schemas.microsoft.com/office/drawing/2014/main" xmlns="" id="{04715C11-605F-4B8F-81A6-8B5B738C3050}"/>
               </a:ext>
             </a:extLst>
           </p:cNvPr>
@@ -5179,7 +5179,7 @@
           <p:cNvPr id="2" name="Rechteck 1">
             <a:extLst>
               <a:ext uri="{FF2B5EF4-FFF2-40B4-BE49-F238E27FC236}">
-                <a16:creationId xmlns:a16="http://schemas.microsoft.com/office/drawing/2014/main" id="{D144D94C-2289-4013-A9D0-E50B76235F78}"/>
+                <a16:creationId xmlns:a16="http://schemas.microsoft.com/office/drawing/2014/main" xmlns="" id="{D144D94C-2289-4013-A9D0-E50B76235F78}"/>
               </a:ext>
             </a:extLst>
           </p:cNvPr>
@@ -5231,7 +5231,7 @@
           <p:cNvPr id="4" name="Gerade Verbindung mit Pfeil 3">
             <a:extLst>
               <a:ext uri="{FF2B5EF4-FFF2-40B4-BE49-F238E27FC236}">
-                <a16:creationId xmlns:a16="http://schemas.microsoft.com/office/drawing/2014/main" id="{4505AB64-DC1C-4AEE-AD57-F2CA0E3FA2E9}"/>
+                <a16:creationId xmlns:a16="http://schemas.microsoft.com/office/drawing/2014/main" xmlns="" id="{4505AB64-DC1C-4AEE-AD57-F2CA0E3FA2E9}"/>
               </a:ext>
             </a:extLst>
           </p:cNvPr>
@@ -5276,7 +5276,7 @@
           <p:cNvPr id="8" name="Gerade Verbindung mit Pfeil 7">
             <a:extLst>
               <a:ext uri="{FF2B5EF4-FFF2-40B4-BE49-F238E27FC236}">
-                <a16:creationId xmlns:a16="http://schemas.microsoft.com/office/drawing/2014/main" id="{B5B15429-6E3F-4F11-BD32-07D58259D622}"/>
+                <a16:creationId xmlns:a16="http://schemas.microsoft.com/office/drawing/2014/main" xmlns="" id="{B5B15429-6E3F-4F11-BD32-07D58259D622}"/>
               </a:ext>
             </a:extLst>
           </p:cNvPr>
@@ -5320,7 +5320,7 @@
           <p:cNvPr id="9" name="Gerade Verbindung mit Pfeil 8">
             <a:extLst>
               <a:ext uri="{FF2B5EF4-FFF2-40B4-BE49-F238E27FC236}">
-                <a16:creationId xmlns:a16="http://schemas.microsoft.com/office/drawing/2014/main" id="{B66E2304-7E01-46A7-919B-5153ACF897CB}"/>
+                <a16:creationId xmlns:a16="http://schemas.microsoft.com/office/drawing/2014/main" xmlns="" id="{B66E2304-7E01-46A7-919B-5153ACF897CB}"/>
               </a:ext>
             </a:extLst>
           </p:cNvPr>
@@ -5364,7 +5364,7 @@
           <p:cNvPr id="5" name="Gruppieren 4">
             <a:extLst>
               <a:ext uri="{FF2B5EF4-FFF2-40B4-BE49-F238E27FC236}">
-                <a16:creationId xmlns:a16="http://schemas.microsoft.com/office/drawing/2014/main" id="{BCFB85C1-C4B1-4E5E-A3BB-FA9706001FA8}"/>
+                <a16:creationId xmlns:a16="http://schemas.microsoft.com/office/drawing/2014/main" xmlns="" id="{BCFB85C1-C4B1-4E5E-A3BB-FA9706001FA8}"/>
               </a:ext>
             </a:extLst>
           </p:cNvPr>
@@ -5384,7 +5384,7 @@
             <p:cNvPr id="3" name="Gruppieren 2">
               <a:extLst>
                 <a:ext uri="{FF2B5EF4-FFF2-40B4-BE49-F238E27FC236}">
-                  <a16:creationId xmlns:a16="http://schemas.microsoft.com/office/drawing/2014/main" id="{154378B4-0281-4001-908D-1C186E31E567}"/>
+                  <a16:creationId xmlns:a16="http://schemas.microsoft.com/office/drawing/2014/main" xmlns="" id="{154378B4-0281-4001-908D-1C186E31E567}"/>
                 </a:ext>
               </a:extLst>
             </p:cNvPr>
@@ -5404,7 +5404,7 @@
               <p:cNvPr id="24" name="Gerade Verbindung mit Pfeil 23">
                 <a:extLst>
                   <a:ext uri="{FF2B5EF4-FFF2-40B4-BE49-F238E27FC236}">
-                    <a16:creationId xmlns:a16="http://schemas.microsoft.com/office/drawing/2014/main" id="{310442C6-9E91-4C86-A911-88EF52519BA8}"/>
+                    <a16:creationId xmlns:a16="http://schemas.microsoft.com/office/drawing/2014/main" xmlns="" id="{310442C6-9E91-4C86-A911-88EF52519BA8}"/>
                   </a:ext>
                 </a:extLst>
               </p:cNvPr>
@@ -5443,7 +5443,7 @@
               <p:cNvPr id="26" name="Gerade Verbindung mit Pfeil 25">
                 <a:extLst>
                   <a:ext uri="{FF2B5EF4-FFF2-40B4-BE49-F238E27FC236}">
-                    <a16:creationId xmlns:a16="http://schemas.microsoft.com/office/drawing/2014/main" id="{410FEC98-82F4-4707-84F3-E2A3A8FD521B}"/>
+                    <a16:creationId xmlns:a16="http://schemas.microsoft.com/office/drawing/2014/main" xmlns="" id="{410FEC98-82F4-4707-84F3-E2A3A8FD521B}"/>
                   </a:ext>
                 </a:extLst>
               </p:cNvPr>
@@ -5484,7 +5484,7 @@
               <p:cNvPr id="28" name="Textfeld 27">
                 <a:extLst>
                   <a:ext uri="{FF2B5EF4-FFF2-40B4-BE49-F238E27FC236}">
-                    <a16:creationId xmlns:a16="http://schemas.microsoft.com/office/drawing/2014/main" id="{18DD6999-5CFE-4405-B945-25C14D02FEF5}"/>
+                    <a16:creationId xmlns:a16="http://schemas.microsoft.com/office/drawing/2014/main" xmlns="" id="{18DD6999-5CFE-4405-B945-25C14D02FEF5}"/>
                   </a:ext>
                 </a:extLst>
               </p:cNvPr>
@@ -5520,7 +5520,7 @@
             <p:cNvPr id="29" name="Textfeld 28">
               <a:extLst>
                 <a:ext uri="{FF2B5EF4-FFF2-40B4-BE49-F238E27FC236}">
-                  <a16:creationId xmlns:a16="http://schemas.microsoft.com/office/drawing/2014/main" id="{72E3181E-BA35-4B43-8E82-5492F61E06FB}"/>
+                  <a16:creationId xmlns:a16="http://schemas.microsoft.com/office/drawing/2014/main" xmlns="" id="{72E3181E-BA35-4B43-8E82-5492F61E06FB}"/>
                 </a:ext>
               </a:extLst>
             </p:cNvPr>
@@ -5556,7 +5556,7 @@
           <p:cNvPr id="6" name="Gruppieren 5">
             <a:extLst>
               <a:ext uri="{FF2B5EF4-FFF2-40B4-BE49-F238E27FC236}">
-                <a16:creationId xmlns:a16="http://schemas.microsoft.com/office/drawing/2014/main" id="{9B98FCCE-B2CE-47C2-BBB0-D6E9EC907671}"/>
+                <a16:creationId xmlns:a16="http://schemas.microsoft.com/office/drawing/2014/main" xmlns="" id="{9B98FCCE-B2CE-47C2-BBB0-D6E9EC907671}"/>
               </a:ext>
             </a:extLst>
           </p:cNvPr>
@@ -5576,7 +5576,7 @@
             <p:cNvPr id="16" name="Gerade Verbindung mit Pfeil 15">
               <a:extLst>
                 <a:ext uri="{FF2B5EF4-FFF2-40B4-BE49-F238E27FC236}">
-                  <a16:creationId xmlns:a16="http://schemas.microsoft.com/office/drawing/2014/main" id="{B1487A4C-D5C8-449F-A12B-5A5CAA93DE59}"/>
+                  <a16:creationId xmlns:a16="http://schemas.microsoft.com/office/drawing/2014/main" xmlns="" id="{B1487A4C-D5C8-449F-A12B-5A5CAA93DE59}"/>
                 </a:ext>
               </a:extLst>
             </p:cNvPr>
@@ -5618,7 +5618,7 @@
             <p:cNvPr id="18" name="Gerade Verbindung mit Pfeil 17">
               <a:extLst>
                 <a:ext uri="{FF2B5EF4-FFF2-40B4-BE49-F238E27FC236}">
-                  <a16:creationId xmlns:a16="http://schemas.microsoft.com/office/drawing/2014/main" id="{EFAA1BE7-4B70-4DAF-802D-BCB4141E7E5F}"/>
+                  <a16:creationId xmlns:a16="http://schemas.microsoft.com/office/drawing/2014/main" xmlns="" id="{EFAA1BE7-4B70-4DAF-802D-BCB4141E7E5F}"/>
                 </a:ext>
               </a:extLst>
             </p:cNvPr>
@@ -5660,7 +5660,7 @@
             <p:cNvPr id="20" name="Gerade Verbindung mit Pfeil 19">
               <a:extLst>
                 <a:ext uri="{FF2B5EF4-FFF2-40B4-BE49-F238E27FC236}">
-                  <a16:creationId xmlns:a16="http://schemas.microsoft.com/office/drawing/2014/main" id="{7ACA4C1C-ECE5-44D0-9F38-2282B9102AF8}"/>
+                  <a16:creationId xmlns:a16="http://schemas.microsoft.com/office/drawing/2014/main" xmlns="" id="{7ACA4C1C-ECE5-44D0-9F38-2282B9102AF8}"/>
                 </a:ext>
               </a:extLst>
             </p:cNvPr>
@@ -5702,7 +5702,7 @@
             <p:cNvPr id="22" name="Gerade Verbindung mit Pfeil 21">
               <a:extLst>
                 <a:ext uri="{FF2B5EF4-FFF2-40B4-BE49-F238E27FC236}">
-                  <a16:creationId xmlns:a16="http://schemas.microsoft.com/office/drawing/2014/main" id="{44927AA6-8F0D-4DAA-B895-0D7093E28BA1}"/>
+                  <a16:creationId xmlns:a16="http://schemas.microsoft.com/office/drawing/2014/main" xmlns="" id="{44927AA6-8F0D-4DAA-B895-0D7093E28BA1}"/>
                 </a:ext>
               </a:extLst>
             </p:cNvPr>
@@ -5744,7 +5744,7 @@
             <p:cNvPr id="30" name="Textfeld 29">
               <a:extLst>
                 <a:ext uri="{FF2B5EF4-FFF2-40B4-BE49-F238E27FC236}">
-                  <a16:creationId xmlns:a16="http://schemas.microsoft.com/office/drawing/2014/main" id="{9B4D3990-7E7B-4EAE-ABDF-87D303B99CB3}"/>
+                  <a16:creationId xmlns:a16="http://schemas.microsoft.com/office/drawing/2014/main" xmlns="" id="{9B4D3990-7E7B-4EAE-ABDF-87D303B99CB3}"/>
                 </a:ext>
               </a:extLst>
             </p:cNvPr>
@@ -5797,7 +5797,7 @@
             <p:cNvPr id="31" name="Textfeld 30">
               <a:extLst>
                 <a:ext uri="{FF2B5EF4-FFF2-40B4-BE49-F238E27FC236}">
-                  <a16:creationId xmlns:a16="http://schemas.microsoft.com/office/drawing/2014/main" id="{0E3472A2-C2A7-48F3-A218-B7D8ECF2FE50}"/>
+                  <a16:creationId xmlns:a16="http://schemas.microsoft.com/office/drawing/2014/main" xmlns="" id="{0E3472A2-C2A7-48F3-A218-B7D8ECF2FE50}"/>
                 </a:ext>
               </a:extLst>
             </p:cNvPr>
@@ -5850,7 +5850,7 @@
             <p:cNvPr id="32" name="Textfeld 31">
               <a:extLst>
                 <a:ext uri="{FF2B5EF4-FFF2-40B4-BE49-F238E27FC236}">
-                  <a16:creationId xmlns:a16="http://schemas.microsoft.com/office/drawing/2014/main" id="{6FB5C9B1-05AD-42F6-8D07-F962E1DBBC09}"/>
+                  <a16:creationId xmlns:a16="http://schemas.microsoft.com/office/drawing/2014/main" xmlns="" id="{6FB5C9B1-05AD-42F6-8D07-F962E1DBBC09}"/>
                 </a:ext>
               </a:extLst>
             </p:cNvPr>
@@ -5903,7 +5903,7 @@
             <p:cNvPr id="33" name="Textfeld 32">
               <a:extLst>
                 <a:ext uri="{FF2B5EF4-FFF2-40B4-BE49-F238E27FC236}">
-                  <a16:creationId xmlns:a16="http://schemas.microsoft.com/office/drawing/2014/main" id="{7FB2C589-995B-4555-A338-BF1B946E0D56}"/>
+                  <a16:creationId xmlns:a16="http://schemas.microsoft.com/office/drawing/2014/main" xmlns="" id="{7FB2C589-995B-4555-A338-BF1B946E0D56}"/>
                 </a:ext>
               </a:extLst>
             </p:cNvPr>
@@ -5957,7 +5957,7 @@
           <p:cNvPr id="34" name="Textfeld 33">
             <a:extLst>
               <a:ext uri="{FF2B5EF4-FFF2-40B4-BE49-F238E27FC236}">
-                <a16:creationId xmlns:a16="http://schemas.microsoft.com/office/drawing/2014/main" id="{BF4B2FAD-B656-4F08-B9E4-344801DB9BC4}"/>
+                <a16:creationId xmlns:a16="http://schemas.microsoft.com/office/drawing/2014/main" xmlns="" id="{BF4B2FAD-B656-4F08-B9E4-344801DB9BC4}"/>
               </a:ext>
             </a:extLst>
           </p:cNvPr>
@@ -6002,7 +6002,7 @@
           <p:cNvPr id="35" name="Textfeld 34">
             <a:extLst>
               <a:ext uri="{FF2B5EF4-FFF2-40B4-BE49-F238E27FC236}">
-                <a16:creationId xmlns:a16="http://schemas.microsoft.com/office/drawing/2014/main" id="{865E304E-5C43-45D5-9D95-071105971C78}"/>
+                <a16:creationId xmlns:a16="http://schemas.microsoft.com/office/drawing/2014/main" xmlns="" id="{865E304E-5C43-45D5-9D95-071105971C78}"/>
               </a:ext>
             </a:extLst>
           </p:cNvPr>
@@ -6047,7 +6047,7 @@
           <p:cNvPr id="36" name="Textfeld 35">
             <a:extLst>
               <a:ext uri="{FF2B5EF4-FFF2-40B4-BE49-F238E27FC236}">
-                <a16:creationId xmlns:a16="http://schemas.microsoft.com/office/drawing/2014/main" id="{607D972F-1A74-4A52-8A88-9EDC83AFC9B4}"/>
+                <a16:creationId xmlns:a16="http://schemas.microsoft.com/office/drawing/2014/main" xmlns="" id="{607D972F-1A74-4A52-8A88-9EDC83AFC9B4}"/>
               </a:ext>
             </a:extLst>
           </p:cNvPr>
@@ -6092,7 +6092,7 @@
           <p:cNvPr id="40" name="Gerader Verbinder 39">
             <a:extLst>
               <a:ext uri="{FF2B5EF4-FFF2-40B4-BE49-F238E27FC236}">
-                <a16:creationId xmlns:a16="http://schemas.microsoft.com/office/drawing/2014/main" id="{8EF695A0-2CBC-4393-A369-3119AB7B7113}"/>
+                <a16:creationId xmlns:a16="http://schemas.microsoft.com/office/drawing/2014/main" xmlns="" id="{8EF695A0-2CBC-4393-A369-3119AB7B7113}"/>
               </a:ext>
             </a:extLst>
           </p:cNvPr>
@@ -6133,7 +6133,7 @@
           <p:cNvPr id="27" name="Gerade Verbindung mit Pfeil 26">
             <a:extLst>
               <a:ext uri="{FF2B5EF4-FFF2-40B4-BE49-F238E27FC236}">
-                <a16:creationId xmlns:a16="http://schemas.microsoft.com/office/drawing/2014/main" id="{7F8DBCB3-B451-46CA-8138-8426D9998553}"/>
+                <a16:creationId xmlns:a16="http://schemas.microsoft.com/office/drawing/2014/main" xmlns="" id="{7F8DBCB3-B451-46CA-8138-8426D9998553}"/>
               </a:ext>
             </a:extLst>
           </p:cNvPr>
@@ -6176,7 +6176,7 @@
           <p:cNvPr id="37" name="Textfeld 36">
             <a:extLst>
               <a:ext uri="{FF2B5EF4-FFF2-40B4-BE49-F238E27FC236}">
-                <a16:creationId xmlns:a16="http://schemas.microsoft.com/office/drawing/2014/main" id="{9AD966CB-9CBB-4348-9AD4-A41690F519C8}"/>
+                <a16:creationId xmlns:a16="http://schemas.microsoft.com/office/drawing/2014/main" xmlns="" id="{9AD966CB-9CBB-4348-9AD4-A41690F519C8}"/>
               </a:ext>
             </a:extLst>
           </p:cNvPr>
@@ -6221,7 +6221,7 @@
           <p:cNvPr id="38" name="Gerade Verbindung mit Pfeil 37">
             <a:extLst>
               <a:ext uri="{FF2B5EF4-FFF2-40B4-BE49-F238E27FC236}">
-                <a16:creationId xmlns:a16="http://schemas.microsoft.com/office/drawing/2014/main" id="{A97DFDB0-59DD-4EED-96A1-79BD36493742}"/>
+                <a16:creationId xmlns:a16="http://schemas.microsoft.com/office/drawing/2014/main" xmlns="" id="{A97DFDB0-59DD-4EED-96A1-79BD36493742}"/>
               </a:ext>
             </a:extLst>
           </p:cNvPr>
@@ -6264,7 +6264,7 @@
           <p:cNvPr id="41" name="Textfeld 40">
             <a:extLst>
               <a:ext uri="{FF2B5EF4-FFF2-40B4-BE49-F238E27FC236}">
-                <a16:creationId xmlns:a16="http://schemas.microsoft.com/office/drawing/2014/main" id="{7F86DFD9-7A7E-41F0-9C26-CD77C1974F97}"/>
+                <a16:creationId xmlns:a16="http://schemas.microsoft.com/office/drawing/2014/main" xmlns="" id="{7F86DFD9-7A7E-41F0-9C26-CD77C1974F97}"/>
               </a:ext>
             </a:extLst>
           </p:cNvPr>
@@ -6339,7 +6339,7 @@
           <p:cNvPr id="5" name="Rechteck 4">
             <a:extLst>
               <a:ext uri="{FF2B5EF4-FFF2-40B4-BE49-F238E27FC236}">
-                <a16:creationId xmlns:a16="http://schemas.microsoft.com/office/drawing/2014/main" id="{DED36884-F986-4734-9114-90B3726D3911}"/>
+                <a16:creationId xmlns:a16="http://schemas.microsoft.com/office/drawing/2014/main" xmlns="" id="{DED36884-F986-4734-9114-90B3726D3911}"/>
               </a:ext>
             </a:extLst>
           </p:cNvPr>
@@ -6393,7 +6393,7 @@
           <p:cNvPr id="4" name="Rechteck 3">
             <a:extLst>
               <a:ext uri="{FF2B5EF4-FFF2-40B4-BE49-F238E27FC236}">
-                <a16:creationId xmlns:a16="http://schemas.microsoft.com/office/drawing/2014/main" id="{D79D1553-633E-457F-BE19-3966945D0A8F}"/>
+                <a16:creationId xmlns:a16="http://schemas.microsoft.com/office/drawing/2014/main" xmlns="" id="{D79D1553-633E-457F-BE19-3966945D0A8F}"/>
               </a:ext>
             </a:extLst>
           </p:cNvPr>
@@ -6447,7 +6447,7 @@
           <p:cNvPr id="3" name="Gerader Verbinder 2">
             <a:extLst>
               <a:ext uri="{FF2B5EF4-FFF2-40B4-BE49-F238E27FC236}">
-                <a16:creationId xmlns:a16="http://schemas.microsoft.com/office/drawing/2014/main" id="{1250052E-CE76-4C37-BCE4-97AD7A2559A4}"/>
+                <a16:creationId xmlns:a16="http://schemas.microsoft.com/office/drawing/2014/main" xmlns="" id="{1250052E-CE76-4C37-BCE4-97AD7A2559A4}"/>
               </a:ext>
             </a:extLst>
           </p:cNvPr>
@@ -6488,7 +6488,7 @@
           <p:cNvPr id="6" name="Textfeld 5">
             <a:extLst>
               <a:ext uri="{FF2B5EF4-FFF2-40B4-BE49-F238E27FC236}">
-                <a16:creationId xmlns:a16="http://schemas.microsoft.com/office/drawing/2014/main" id="{0485B196-4F97-402E-A841-7AE30AA7BFB6}"/>
+                <a16:creationId xmlns:a16="http://schemas.microsoft.com/office/drawing/2014/main" xmlns="" id="{0485B196-4F97-402E-A841-7AE30AA7BFB6}"/>
               </a:ext>
             </a:extLst>
           </p:cNvPr>
@@ -6531,7 +6531,7 @@
           <p:cNvPr id="7" name="Textfeld 6">
             <a:extLst>
               <a:ext uri="{FF2B5EF4-FFF2-40B4-BE49-F238E27FC236}">
-                <a16:creationId xmlns:a16="http://schemas.microsoft.com/office/drawing/2014/main" id="{AF80A6D4-7E54-46C5-A3C4-F3FED4910D79}"/>
+                <a16:creationId xmlns:a16="http://schemas.microsoft.com/office/drawing/2014/main" xmlns="" id="{AF80A6D4-7E54-46C5-A3C4-F3FED4910D79}"/>
               </a:ext>
             </a:extLst>
           </p:cNvPr>
@@ -6588,7 +6588,7 @@
           <p:cNvPr id="10" name="Textfeld 9">
             <a:extLst>
               <a:ext uri="{FF2B5EF4-FFF2-40B4-BE49-F238E27FC236}">
-                <a16:creationId xmlns:a16="http://schemas.microsoft.com/office/drawing/2014/main" id="{A34CE71D-182E-4919-9015-C26A760E9A73}"/>
+                <a16:creationId xmlns:a16="http://schemas.microsoft.com/office/drawing/2014/main" xmlns="" id="{A34CE71D-182E-4919-9015-C26A760E9A73}"/>
               </a:ext>
             </a:extLst>
           </p:cNvPr>
@@ -6631,7 +6631,7 @@
           <p:cNvPr id="11" name="Gerade Verbindung mit Pfeil 10">
             <a:extLst>
               <a:ext uri="{FF2B5EF4-FFF2-40B4-BE49-F238E27FC236}">
-                <a16:creationId xmlns:a16="http://schemas.microsoft.com/office/drawing/2014/main" id="{8027C559-094D-44C0-8A1C-A87E7BBB8F78}"/>
+                <a16:creationId xmlns:a16="http://schemas.microsoft.com/office/drawing/2014/main" xmlns="" id="{8027C559-094D-44C0-8A1C-A87E7BBB8F78}"/>
               </a:ext>
             </a:extLst>
           </p:cNvPr>
@@ -6673,7 +6673,7 @@
           <p:cNvPr id="12" name="Gerade Verbindung mit Pfeil 11">
             <a:extLst>
               <a:ext uri="{FF2B5EF4-FFF2-40B4-BE49-F238E27FC236}">
-                <a16:creationId xmlns:a16="http://schemas.microsoft.com/office/drawing/2014/main" id="{CEBFCD90-2926-490C-9CBE-662467F982CF}"/>
+                <a16:creationId xmlns:a16="http://schemas.microsoft.com/office/drawing/2014/main" xmlns="" id="{CEBFCD90-2926-490C-9CBE-662467F982CF}"/>
               </a:ext>
             </a:extLst>
           </p:cNvPr>
@@ -6715,7 +6715,7 @@
           <p:cNvPr id="13" name="Gerade Verbindung mit Pfeil 12">
             <a:extLst>
               <a:ext uri="{FF2B5EF4-FFF2-40B4-BE49-F238E27FC236}">
-                <a16:creationId xmlns:a16="http://schemas.microsoft.com/office/drawing/2014/main" id="{6D6F7A55-B3AC-4A6D-94D2-98A6E801C59A}"/>
+                <a16:creationId xmlns:a16="http://schemas.microsoft.com/office/drawing/2014/main" xmlns="" id="{6D6F7A55-B3AC-4A6D-94D2-98A6E801C59A}"/>
               </a:ext>
             </a:extLst>
           </p:cNvPr>
@@ -6757,7 +6757,7 @@
           <p:cNvPr id="14" name="Gerade Verbindung mit Pfeil 13">
             <a:extLst>
               <a:ext uri="{FF2B5EF4-FFF2-40B4-BE49-F238E27FC236}">
-                <a16:creationId xmlns:a16="http://schemas.microsoft.com/office/drawing/2014/main" id="{782C1408-D9EA-493E-9259-176FDF5163EC}"/>
+                <a16:creationId xmlns:a16="http://schemas.microsoft.com/office/drawing/2014/main" xmlns="" id="{782C1408-D9EA-493E-9259-176FDF5163EC}"/>
               </a:ext>
             </a:extLst>
           </p:cNvPr>
@@ -6799,7 +6799,7 @@
           <p:cNvPr id="19" name="Textfeld 18">
             <a:extLst>
               <a:ext uri="{FF2B5EF4-FFF2-40B4-BE49-F238E27FC236}">
-                <a16:creationId xmlns:a16="http://schemas.microsoft.com/office/drawing/2014/main" id="{117CFCC0-43CF-4716-8794-23A7922E2AA6}"/>
+                <a16:creationId xmlns:a16="http://schemas.microsoft.com/office/drawing/2014/main" xmlns="" id="{117CFCC0-43CF-4716-8794-23A7922E2AA6}"/>
               </a:ext>
             </a:extLst>
           </p:cNvPr>
@@ -6852,7 +6852,7 @@
           <p:cNvPr id="20" name="Textfeld 19">
             <a:extLst>
               <a:ext uri="{FF2B5EF4-FFF2-40B4-BE49-F238E27FC236}">
-                <a16:creationId xmlns:a16="http://schemas.microsoft.com/office/drawing/2014/main" id="{DEB576D0-C61B-40B3-9A2E-9E96AFACBF00}"/>
+                <a16:creationId xmlns:a16="http://schemas.microsoft.com/office/drawing/2014/main" xmlns="" id="{DEB576D0-C61B-40B3-9A2E-9E96AFACBF00}"/>
               </a:ext>
             </a:extLst>
           </p:cNvPr>
@@ -6905,7 +6905,7 @@
           <p:cNvPr id="21" name="Textfeld 20">
             <a:extLst>
               <a:ext uri="{FF2B5EF4-FFF2-40B4-BE49-F238E27FC236}">
-                <a16:creationId xmlns:a16="http://schemas.microsoft.com/office/drawing/2014/main" id="{86970C7E-C3C5-4F62-ABED-74FC8B5277E5}"/>
+                <a16:creationId xmlns:a16="http://schemas.microsoft.com/office/drawing/2014/main" xmlns="" id="{86970C7E-C3C5-4F62-ABED-74FC8B5277E5}"/>
               </a:ext>
             </a:extLst>
           </p:cNvPr>
@@ -6958,7 +6958,7 @@
           <p:cNvPr id="22" name="Textfeld 21">
             <a:extLst>
               <a:ext uri="{FF2B5EF4-FFF2-40B4-BE49-F238E27FC236}">
-                <a16:creationId xmlns:a16="http://schemas.microsoft.com/office/drawing/2014/main" id="{6A6A44E9-EF16-4E53-9EB2-C72D7C4D0168}"/>
+                <a16:creationId xmlns:a16="http://schemas.microsoft.com/office/drawing/2014/main" xmlns="" id="{6A6A44E9-EF16-4E53-9EB2-C72D7C4D0168}"/>
               </a:ext>
             </a:extLst>
           </p:cNvPr>
@@ -7011,7 +7011,7 @@
           <p:cNvPr id="2" name="Trapezoid 1">
             <a:extLst>
               <a:ext uri="{FF2B5EF4-FFF2-40B4-BE49-F238E27FC236}">
-                <a16:creationId xmlns:a16="http://schemas.microsoft.com/office/drawing/2014/main" id="{4F717245-6F2B-436C-B06F-B71C4C9B7378}"/>
+                <a16:creationId xmlns:a16="http://schemas.microsoft.com/office/drawing/2014/main" xmlns="" id="{4F717245-6F2B-436C-B06F-B71C4C9B7378}"/>
               </a:ext>
             </a:extLst>
           </p:cNvPr>
@@ -7065,7 +7065,7 @@
           <p:cNvPr id="9" name="Gerade Verbindung mit Pfeil 8">
             <a:extLst>
               <a:ext uri="{FF2B5EF4-FFF2-40B4-BE49-F238E27FC236}">
-                <a16:creationId xmlns:a16="http://schemas.microsoft.com/office/drawing/2014/main" id="{736B5B27-66CF-44DD-84A3-BD288082062C}"/>
+                <a16:creationId xmlns:a16="http://schemas.microsoft.com/office/drawing/2014/main" xmlns="" id="{736B5B27-66CF-44DD-84A3-BD288082062C}"/>
               </a:ext>
             </a:extLst>
           </p:cNvPr>
@@ -7105,7 +7105,7 @@
           <p:cNvPr id="16" name="Gerade Verbindung mit Pfeil 15">
             <a:extLst>
               <a:ext uri="{FF2B5EF4-FFF2-40B4-BE49-F238E27FC236}">
-                <a16:creationId xmlns:a16="http://schemas.microsoft.com/office/drawing/2014/main" id="{DABD9667-9DFD-4DB6-97F0-18387CAF0F38}"/>
+                <a16:creationId xmlns:a16="http://schemas.microsoft.com/office/drawing/2014/main" xmlns="" id="{DABD9667-9DFD-4DB6-97F0-18387CAF0F38}"/>
               </a:ext>
             </a:extLst>
           </p:cNvPr>
@@ -7148,7 +7148,7 @@
           <p:cNvPr id="23" name="Gerader Verbinder 22">
             <a:extLst>
               <a:ext uri="{FF2B5EF4-FFF2-40B4-BE49-F238E27FC236}">
-                <a16:creationId xmlns:a16="http://schemas.microsoft.com/office/drawing/2014/main" id="{BC0D837E-7A20-4C6C-B1AF-2C945E921F4B}"/>
+                <a16:creationId xmlns:a16="http://schemas.microsoft.com/office/drawing/2014/main" xmlns="" id="{BC0D837E-7A20-4C6C-B1AF-2C945E921F4B}"/>
               </a:ext>
             </a:extLst>
           </p:cNvPr>
@@ -7189,7 +7189,7 @@
           <p:cNvPr id="24" name="Textfeld 23">
             <a:extLst>
               <a:ext uri="{FF2B5EF4-FFF2-40B4-BE49-F238E27FC236}">
-                <a16:creationId xmlns:a16="http://schemas.microsoft.com/office/drawing/2014/main" id="{3D91693A-F571-4648-A721-AE0D77DF7B77}"/>
+                <a16:creationId xmlns:a16="http://schemas.microsoft.com/office/drawing/2014/main" xmlns="" id="{3D91693A-F571-4648-A721-AE0D77DF7B77}"/>
               </a:ext>
             </a:extLst>
           </p:cNvPr>
@@ -7198,8 +7198,8 @@
         </p:nvSpPr>
         <p:spPr>
           <a:xfrm>
-            <a:off x="5652165" y="3677638"/>
-            <a:ext cx="296777" cy="369323"/>
+            <a:off x="5580402" y="3677634"/>
+            <a:ext cx="637636" cy="369332"/>
           </a:xfrm>
           <a:prstGeom prst="rect">
             <a:avLst/>
@@ -7213,9 +7213,10 @@
           <a:lstStyle/>
           <a:p>
             <a:r>
-              <a:rPr lang="de-DE" dirty="0"/>
-              <a:t>1</a:t>
-            </a:r>
+              <a:rPr lang="de-DE" dirty="0" smtClean="0"/>
+              <a:t>0,5</a:t>
+            </a:r>
+            <a:endParaRPr lang="de-DE" dirty="0"/>
           </a:p>
         </p:txBody>
       </p:sp>
@@ -7224,7 +7225,7 @@
           <p:cNvPr id="25" name="Textfeld 24">
             <a:extLst>
               <a:ext uri="{FF2B5EF4-FFF2-40B4-BE49-F238E27FC236}">
-                <a16:creationId xmlns:a16="http://schemas.microsoft.com/office/drawing/2014/main" id="{9BE60142-237A-4092-9739-F5F8312D50B8}"/>
+                <a16:creationId xmlns:a16="http://schemas.microsoft.com/office/drawing/2014/main" xmlns="" id="{9BE60142-237A-4092-9739-F5F8312D50B8}"/>
               </a:ext>
             </a:extLst>
           </p:cNvPr>
@@ -7262,7 +7263,7 @@
           <p:cNvPr id="29" name="Gerader Verbinder 28">
             <a:extLst>
               <a:ext uri="{FF2B5EF4-FFF2-40B4-BE49-F238E27FC236}">
-                <a16:creationId xmlns:a16="http://schemas.microsoft.com/office/drawing/2014/main" id="{788316D7-337D-431C-A45A-EBA065B78F2F}"/>
+                <a16:creationId xmlns:a16="http://schemas.microsoft.com/office/drawing/2014/main" xmlns="" id="{788316D7-337D-431C-A45A-EBA065B78F2F}"/>
               </a:ext>
             </a:extLst>
           </p:cNvPr>
@@ -7303,7 +7304,7 @@
           <p:cNvPr id="30" name="Gerader Verbinder 29">
             <a:extLst>
               <a:ext uri="{FF2B5EF4-FFF2-40B4-BE49-F238E27FC236}">
-                <a16:creationId xmlns:a16="http://schemas.microsoft.com/office/drawing/2014/main" id="{F9B4F609-2AE1-4D44-AA52-2F5498C6D77E}"/>
+                <a16:creationId xmlns:a16="http://schemas.microsoft.com/office/drawing/2014/main" xmlns="" id="{F9B4F609-2AE1-4D44-AA52-2F5498C6D77E}"/>
               </a:ext>
             </a:extLst>
           </p:cNvPr>
@@ -7344,7 +7345,7 @@
           <p:cNvPr id="36" name="Gerade Verbindung mit Pfeil 35">
             <a:extLst>
               <a:ext uri="{FF2B5EF4-FFF2-40B4-BE49-F238E27FC236}">
-                <a16:creationId xmlns:a16="http://schemas.microsoft.com/office/drawing/2014/main" id="{9D32FDFD-A1DB-49AD-849D-CBD2A2539613}"/>
+                <a16:creationId xmlns:a16="http://schemas.microsoft.com/office/drawing/2014/main" xmlns="" id="{9D32FDFD-A1DB-49AD-849D-CBD2A2539613}"/>
               </a:ext>
             </a:extLst>
           </p:cNvPr>
@@ -7384,7 +7385,7 @@
           <p:cNvPr id="42" name="Textfeld 41">
             <a:extLst>
               <a:ext uri="{FF2B5EF4-FFF2-40B4-BE49-F238E27FC236}">
-                <a16:creationId xmlns:a16="http://schemas.microsoft.com/office/drawing/2014/main" id="{7493AC64-15BE-4EA6-8088-C0806EB9FD43}"/>
+                <a16:creationId xmlns:a16="http://schemas.microsoft.com/office/drawing/2014/main" xmlns="" id="{7493AC64-15BE-4EA6-8088-C0806EB9FD43}"/>
               </a:ext>
             </a:extLst>
           </p:cNvPr>
@@ -7415,6 +7416,123 @@
           </a:p>
         </p:txBody>
       </p:sp>
+      <p:sp>
+        <p:nvSpPr>
+          <p:cNvPr id="26" name="Textfeld 25">
+            <a:extLst>
+              <a:ext uri="{FF2B5EF4-FFF2-40B4-BE49-F238E27FC236}">
+                <a16:creationId xmlns:a16="http://schemas.microsoft.com/office/drawing/2014/main" xmlns="" id="{3D91693A-F571-4648-A721-AE0D77DF7B77}"/>
+              </a:ext>
+            </a:extLst>
+          </p:cNvPr>
+          <p:cNvSpPr txBox="1"/>
+          <p:nvPr/>
+        </p:nvSpPr>
+        <p:spPr>
+          <a:xfrm>
+            <a:off x="7353169" y="3677634"/>
+            <a:ext cx="637636" cy="369332"/>
+          </a:xfrm>
+          <a:prstGeom prst="rect">
+            <a:avLst/>
+          </a:prstGeom>
+          <a:noFill/>
+        </p:spPr>
+        <p:txBody>
+          <a:bodyPr wrap="square" rtlCol="0">
+            <a:spAutoFit/>
+          </a:bodyPr>
+          <a:lstStyle/>
+          <a:p>
+            <a:r>
+              <a:rPr lang="de-DE" dirty="0" smtClean="0"/>
+              <a:t>0,5</a:t>
+            </a:r>
+            <a:endParaRPr lang="de-DE" dirty="0"/>
+          </a:p>
+        </p:txBody>
+      </p:sp>
+      <p:cxnSp>
+        <p:nvCxnSpPr>
+          <p:cNvPr id="27" name="Gerade Verbindung mit Pfeil 26">
+            <a:extLst>
+              <a:ext uri="{FF2B5EF4-FFF2-40B4-BE49-F238E27FC236}">
+                <a16:creationId xmlns:a16="http://schemas.microsoft.com/office/drawing/2014/main" xmlns="" id="{736B5B27-66CF-44DD-84A3-BD288082062C}"/>
+              </a:ext>
+            </a:extLst>
+          </p:cNvPr>
+          <p:cNvCxnSpPr/>
+          <p:nvPr/>
+        </p:nvCxnSpPr>
+        <p:spPr>
+          <a:xfrm>
+            <a:off x="7353169" y="4002845"/>
+            <a:ext cx="426335" cy="0"/>
+          </a:xfrm>
+          <a:prstGeom prst="straightConnector1">
+            <a:avLst/>
+          </a:prstGeom>
+          <a:ln>
+            <a:headEnd type="triangle"/>
+            <a:tailEnd type="triangle"/>
+          </a:ln>
+        </p:spPr>
+        <p:style>
+          <a:lnRef idx="1">
+            <a:schemeClr val="accent1"/>
+          </a:lnRef>
+          <a:fillRef idx="0">
+            <a:schemeClr val="accent1"/>
+          </a:fillRef>
+          <a:effectRef idx="0">
+            <a:schemeClr val="accent1"/>
+          </a:effectRef>
+          <a:fontRef idx="minor">
+            <a:schemeClr val="tx1"/>
+          </a:fontRef>
+        </p:style>
+      </p:cxnSp>
+      <p:cxnSp>
+        <p:nvCxnSpPr>
+          <p:cNvPr id="28" name="Gerader Verbinder 27">
+            <a:extLst>
+              <a:ext uri="{FF2B5EF4-FFF2-40B4-BE49-F238E27FC236}">
+                <a16:creationId xmlns:a16="http://schemas.microsoft.com/office/drawing/2014/main" xmlns="" id="{788316D7-337D-431C-A45A-EBA065B78F2F}"/>
+              </a:ext>
+            </a:extLst>
+          </p:cNvPr>
+          <p:cNvCxnSpPr>
+            <a:cxnSpLocks/>
+          </p:cNvCxnSpPr>
+          <p:nvPr/>
+        </p:nvCxnSpPr>
+        <p:spPr>
+          <a:xfrm>
+            <a:off x="7353169" y="2004370"/>
+            <a:ext cx="0" cy="1717384"/>
+          </a:xfrm>
+          <a:prstGeom prst="line">
+            <a:avLst/>
+          </a:prstGeom>
+          <a:ln>
+            <a:prstDash val="dash"/>
+          </a:ln>
+        </p:spPr>
+        <p:style>
+          <a:lnRef idx="1">
+            <a:schemeClr val="accent1"/>
+          </a:lnRef>
+          <a:fillRef idx="0">
+            <a:schemeClr val="accent1"/>
+          </a:fillRef>
+          <a:effectRef idx="0">
+            <a:schemeClr val="accent1"/>
+          </a:effectRef>
+          <a:fontRef idx="minor">
+            <a:schemeClr val="tx1"/>
+          </a:fontRef>
+        </p:style>
+      </p:cxnSp>
     </p:spTree>
     <p:extLst>
       <p:ext uri="{BB962C8B-B14F-4D97-AF65-F5344CB8AC3E}">
@@ -7450,7 +7568,7 @@
           <p:cNvPr id="2" name="Grafik 1">
             <a:extLst>
               <a:ext uri="{FF2B5EF4-FFF2-40B4-BE49-F238E27FC236}">
-                <a16:creationId xmlns:a16="http://schemas.microsoft.com/office/drawing/2014/main" id="{9473062E-2E22-4948-8206-3652FD3AC673}"/>
+                <a16:creationId xmlns:a16="http://schemas.microsoft.com/office/drawing/2014/main" xmlns="" id="{9473062E-2E22-4948-8206-3652FD3AC673}"/>
               </a:ext>
             </a:extLst>
           </p:cNvPr>
@@ -7480,7 +7598,7 @@
           <p:cNvPr id="3" name="Textfeld 2">
             <a:extLst>
               <a:ext uri="{FF2B5EF4-FFF2-40B4-BE49-F238E27FC236}">
-                <a16:creationId xmlns:a16="http://schemas.microsoft.com/office/drawing/2014/main" id="{AB3EB1DE-D0DC-4EEE-B387-DE3332E3CAFB}"/>
+                <a16:creationId xmlns:a16="http://schemas.microsoft.com/office/drawing/2014/main" xmlns="" id="{AB3EB1DE-D0DC-4EEE-B387-DE3332E3CAFB}"/>
               </a:ext>
             </a:extLst>
           </p:cNvPr>
@@ -7519,7 +7637,7 @@
           <p:cNvPr id="4" name="Textfeld 3">
             <a:extLst>
               <a:ext uri="{FF2B5EF4-FFF2-40B4-BE49-F238E27FC236}">
-                <a16:creationId xmlns:a16="http://schemas.microsoft.com/office/drawing/2014/main" id="{C63819E1-C13F-48AC-B690-8E72BF943482}"/>
+                <a16:creationId xmlns:a16="http://schemas.microsoft.com/office/drawing/2014/main" xmlns="" id="{C63819E1-C13F-48AC-B690-8E72BF943482}"/>
               </a:ext>
             </a:extLst>
           </p:cNvPr>
@@ -7558,7 +7676,7 @@
           <p:cNvPr id="5" name="Textfeld 4">
             <a:extLst>
               <a:ext uri="{FF2B5EF4-FFF2-40B4-BE49-F238E27FC236}">
-                <a16:creationId xmlns:a16="http://schemas.microsoft.com/office/drawing/2014/main" id="{A8A013D5-1B4A-4368-AEFD-D7F753EB6A65}"/>
+                <a16:creationId xmlns:a16="http://schemas.microsoft.com/office/drawing/2014/main" xmlns="" id="{A8A013D5-1B4A-4368-AEFD-D7F753EB6A65}"/>
               </a:ext>
             </a:extLst>
           </p:cNvPr>
@@ -7597,7 +7715,7 @@
           <p:cNvPr id="6" name="Textfeld 5">
             <a:extLst>
               <a:ext uri="{FF2B5EF4-FFF2-40B4-BE49-F238E27FC236}">
-                <a16:creationId xmlns:a16="http://schemas.microsoft.com/office/drawing/2014/main" id="{281BDB18-2C18-4E49-AF4C-182F8C411AE9}"/>
+                <a16:creationId xmlns:a16="http://schemas.microsoft.com/office/drawing/2014/main" xmlns="" id="{281BDB18-2C18-4E49-AF4C-182F8C411AE9}"/>
               </a:ext>
             </a:extLst>
           </p:cNvPr>
@@ -7636,7 +7754,7 @@
           <p:cNvPr id="7" name="Textfeld 6">
             <a:extLst>
               <a:ext uri="{FF2B5EF4-FFF2-40B4-BE49-F238E27FC236}">
-                <a16:creationId xmlns:a16="http://schemas.microsoft.com/office/drawing/2014/main" id="{9897389D-EA2E-4CEF-B250-DC0A64F62AEB}"/>
+                <a16:creationId xmlns:a16="http://schemas.microsoft.com/office/drawing/2014/main" xmlns="" id="{9897389D-EA2E-4CEF-B250-DC0A64F62AEB}"/>
               </a:ext>
             </a:extLst>
           </p:cNvPr>
@@ -7675,7 +7793,7 @@
           <p:cNvPr id="8" name="Textfeld 7">
             <a:extLst>
               <a:ext uri="{FF2B5EF4-FFF2-40B4-BE49-F238E27FC236}">
-                <a16:creationId xmlns:a16="http://schemas.microsoft.com/office/drawing/2014/main" id="{EB32411D-4C6B-45CF-9AE8-B23AA21037C8}"/>
+                <a16:creationId xmlns:a16="http://schemas.microsoft.com/office/drawing/2014/main" xmlns="" id="{EB32411D-4C6B-45CF-9AE8-B23AA21037C8}"/>
               </a:ext>
             </a:extLst>
           </p:cNvPr>
@@ -7714,7 +7832,7 @@
           <p:cNvPr id="9" name="Textfeld 8">
             <a:extLst>
               <a:ext uri="{FF2B5EF4-FFF2-40B4-BE49-F238E27FC236}">
-                <a16:creationId xmlns:a16="http://schemas.microsoft.com/office/drawing/2014/main" id="{A958E9C8-D4BA-4BAB-A126-4065E1B83B17}"/>
+                <a16:creationId xmlns:a16="http://schemas.microsoft.com/office/drawing/2014/main" xmlns="" id="{A958E9C8-D4BA-4BAB-A126-4065E1B83B17}"/>
               </a:ext>
             </a:extLst>
           </p:cNvPr>
@@ -7753,7 +7871,7 @@
           <p:cNvPr id="10" name="Textfeld 9">
             <a:extLst>
               <a:ext uri="{FF2B5EF4-FFF2-40B4-BE49-F238E27FC236}">
-                <a16:creationId xmlns:a16="http://schemas.microsoft.com/office/drawing/2014/main" id="{56821859-5AED-4FA4-8511-37033E6B2DEE}"/>
+                <a16:creationId xmlns:a16="http://schemas.microsoft.com/office/drawing/2014/main" xmlns="" id="{56821859-5AED-4FA4-8511-37033E6B2DEE}"/>
               </a:ext>
             </a:extLst>
           </p:cNvPr>
@@ -7822,7 +7940,7 @@
           <p:cNvPr id="2" name="Ellipse 1">
             <a:extLst>
               <a:ext uri="{FF2B5EF4-FFF2-40B4-BE49-F238E27FC236}">
-                <a16:creationId xmlns:a16="http://schemas.microsoft.com/office/drawing/2014/main" id="{A3C97F0F-5EF9-443E-A98B-0F8166DDEC33}"/>
+                <a16:creationId xmlns:a16="http://schemas.microsoft.com/office/drawing/2014/main" xmlns="" id="{A3C97F0F-5EF9-443E-A98B-0F8166DDEC33}"/>
               </a:ext>
             </a:extLst>
           </p:cNvPr>
@@ -7875,7 +7993,7 @@
           <p:cNvPr id="4" name="Gerader Verbinder 3">
             <a:extLst>
               <a:ext uri="{FF2B5EF4-FFF2-40B4-BE49-F238E27FC236}">
-                <a16:creationId xmlns:a16="http://schemas.microsoft.com/office/drawing/2014/main" id="{792E453F-31B4-4912-AB8E-13BD6590C2F1}"/>
+                <a16:creationId xmlns:a16="http://schemas.microsoft.com/office/drawing/2014/main" xmlns="" id="{792E453F-31B4-4912-AB8E-13BD6590C2F1}"/>
               </a:ext>
             </a:extLst>
           </p:cNvPr>
@@ -7913,7 +8031,7 @@
           <p:cNvPr id="7" name="Gerade Verbindung mit Pfeil 6">
             <a:extLst>
               <a:ext uri="{FF2B5EF4-FFF2-40B4-BE49-F238E27FC236}">
-                <a16:creationId xmlns:a16="http://schemas.microsoft.com/office/drawing/2014/main" id="{8DB57880-291F-4FE4-8100-4473C538C41C}"/>
+                <a16:creationId xmlns:a16="http://schemas.microsoft.com/office/drawing/2014/main" xmlns="" id="{8DB57880-291F-4FE4-8100-4473C538C41C}"/>
               </a:ext>
             </a:extLst>
           </p:cNvPr>
@@ -7957,7 +8075,7 @@
           <p:cNvPr id="11" name="Gerader Verbinder 10">
             <a:extLst>
               <a:ext uri="{FF2B5EF4-FFF2-40B4-BE49-F238E27FC236}">
-                <a16:creationId xmlns:a16="http://schemas.microsoft.com/office/drawing/2014/main" id="{CE880E47-4248-406A-8E99-854F14807FF7}"/>
+                <a16:creationId xmlns:a16="http://schemas.microsoft.com/office/drawing/2014/main" xmlns="" id="{CE880E47-4248-406A-8E99-854F14807FF7}"/>
               </a:ext>
             </a:extLst>
           </p:cNvPr>
@@ -7995,7 +8113,7 @@
           <p:cNvPr id="18" name="Gerade Verbindung mit Pfeil 17">
             <a:extLst>
               <a:ext uri="{FF2B5EF4-FFF2-40B4-BE49-F238E27FC236}">
-                <a16:creationId xmlns:a16="http://schemas.microsoft.com/office/drawing/2014/main" id="{A0EA19DA-BC09-40E5-B0A8-52181B2C0C86}"/>
+                <a16:creationId xmlns:a16="http://schemas.microsoft.com/office/drawing/2014/main" xmlns="" id="{A0EA19DA-BC09-40E5-B0A8-52181B2C0C86}"/>
               </a:ext>
             </a:extLst>
           </p:cNvPr>
@@ -8035,7 +8153,7 @@
           <p:cNvPr id="19" name="Textfeld 18">
             <a:extLst>
               <a:ext uri="{FF2B5EF4-FFF2-40B4-BE49-F238E27FC236}">
-                <a16:creationId xmlns:a16="http://schemas.microsoft.com/office/drawing/2014/main" id="{E9B19354-B4AA-46F7-A1A7-1E3357F46439}"/>
+                <a16:creationId xmlns:a16="http://schemas.microsoft.com/office/drawing/2014/main" xmlns="" id="{E9B19354-B4AA-46F7-A1A7-1E3357F46439}"/>
               </a:ext>
             </a:extLst>
           </p:cNvPr>
@@ -8071,7 +8189,7 @@
           <p:cNvPr id="21" name="Gerade Verbindung mit Pfeil 20">
             <a:extLst>
               <a:ext uri="{FF2B5EF4-FFF2-40B4-BE49-F238E27FC236}">
-                <a16:creationId xmlns:a16="http://schemas.microsoft.com/office/drawing/2014/main" id="{76133FA3-49E5-4869-9E78-8C98E25DE382}"/>
+                <a16:creationId xmlns:a16="http://schemas.microsoft.com/office/drawing/2014/main" xmlns="" id="{76133FA3-49E5-4869-9E78-8C98E25DE382}"/>
               </a:ext>
             </a:extLst>
           </p:cNvPr>
@@ -8113,7 +8231,7 @@
           <p:cNvPr id="26" name="Textfeld 25">
             <a:extLst>
               <a:ext uri="{FF2B5EF4-FFF2-40B4-BE49-F238E27FC236}">
-                <a16:creationId xmlns:a16="http://schemas.microsoft.com/office/drawing/2014/main" id="{83F0955B-6758-40B3-84A3-CB4ABD7131AD}"/>
+                <a16:creationId xmlns:a16="http://schemas.microsoft.com/office/drawing/2014/main" xmlns="" id="{83F0955B-6758-40B3-84A3-CB4ABD7131AD}"/>
               </a:ext>
             </a:extLst>
           </p:cNvPr>
@@ -8148,7 +8266,7 @@
           <p:cNvPr id="27" name="Textfeld 26">
             <a:extLst>
               <a:ext uri="{FF2B5EF4-FFF2-40B4-BE49-F238E27FC236}">
-                <a16:creationId xmlns:a16="http://schemas.microsoft.com/office/drawing/2014/main" id="{053DF975-3AA2-4279-82D6-F8980B14928F}"/>
+                <a16:creationId xmlns:a16="http://schemas.microsoft.com/office/drawing/2014/main" xmlns="" id="{053DF975-3AA2-4279-82D6-F8980B14928F}"/>
               </a:ext>
             </a:extLst>
           </p:cNvPr>

</xml_diff>

<commit_message>
Kapitel 5.2 und 5.3 Grafiken
</commit_message>
<xml_diff>
--- a/Grafiken.pptx
+++ b/Grafiken.pptx
@@ -16,6 +16,8 @@
     <p:sldId id="264" r:id="rId10"/>
     <p:sldId id="265" r:id="rId11"/>
     <p:sldId id="266" r:id="rId12"/>
+    <p:sldId id="267" r:id="rId13"/>
+    <p:sldId id="268" r:id="rId14"/>
   </p:sldIdLst>
   <p:sldSz cx="12192000" cy="6858000"/>
   <p:notesSz cx="6858000" cy="9144000"/>
@@ -269,7 +271,7 @@
           <a:p>
             <a:fld id="{1A473A71-948F-4AE8-AF79-80443CCFF2D0}" type="datetimeFigureOut">
               <a:rPr lang="de-DE" smtClean="0"/>
-              <a:t>26.02.2020</a:t>
+              <a:t>05.03.2020</a:t>
             </a:fld>
             <a:endParaRPr lang="de-DE"/>
           </a:p>
@@ -467,7 +469,7 @@
           <a:p>
             <a:fld id="{1A473A71-948F-4AE8-AF79-80443CCFF2D0}" type="datetimeFigureOut">
               <a:rPr lang="de-DE" smtClean="0"/>
-              <a:t>26.02.2020</a:t>
+              <a:t>05.03.2020</a:t>
             </a:fld>
             <a:endParaRPr lang="de-DE"/>
           </a:p>
@@ -675,7 +677,7 @@
           <a:p>
             <a:fld id="{1A473A71-948F-4AE8-AF79-80443CCFF2D0}" type="datetimeFigureOut">
               <a:rPr lang="de-DE" smtClean="0"/>
-              <a:t>26.02.2020</a:t>
+              <a:t>05.03.2020</a:t>
             </a:fld>
             <a:endParaRPr lang="de-DE"/>
           </a:p>
@@ -873,7 +875,7 @@
           <a:p>
             <a:fld id="{1A473A71-948F-4AE8-AF79-80443CCFF2D0}" type="datetimeFigureOut">
               <a:rPr lang="de-DE" smtClean="0"/>
-              <a:t>26.02.2020</a:t>
+              <a:t>05.03.2020</a:t>
             </a:fld>
             <a:endParaRPr lang="de-DE"/>
           </a:p>
@@ -1148,7 +1150,7 @@
           <a:p>
             <a:fld id="{1A473A71-948F-4AE8-AF79-80443CCFF2D0}" type="datetimeFigureOut">
               <a:rPr lang="de-DE" smtClean="0"/>
-              <a:t>26.02.2020</a:t>
+              <a:t>05.03.2020</a:t>
             </a:fld>
             <a:endParaRPr lang="de-DE"/>
           </a:p>
@@ -1413,7 +1415,7 @@
           <a:p>
             <a:fld id="{1A473A71-948F-4AE8-AF79-80443CCFF2D0}" type="datetimeFigureOut">
               <a:rPr lang="de-DE" smtClean="0"/>
-              <a:t>26.02.2020</a:t>
+              <a:t>05.03.2020</a:t>
             </a:fld>
             <a:endParaRPr lang="de-DE"/>
           </a:p>
@@ -1825,7 +1827,7 @@
           <a:p>
             <a:fld id="{1A473A71-948F-4AE8-AF79-80443CCFF2D0}" type="datetimeFigureOut">
               <a:rPr lang="de-DE" smtClean="0"/>
-              <a:t>26.02.2020</a:t>
+              <a:t>05.03.2020</a:t>
             </a:fld>
             <a:endParaRPr lang="de-DE"/>
           </a:p>
@@ -1966,7 +1968,7 @@
           <a:p>
             <a:fld id="{1A473A71-948F-4AE8-AF79-80443CCFF2D0}" type="datetimeFigureOut">
               <a:rPr lang="de-DE" smtClean="0"/>
-              <a:t>26.02.2020</a:t>
+              <a:t>05.03.2020</a:t>
             </a:fld>
             <a:endParaRPr lang="de-DE"/>
           </a:p>
@@ -2079,7 +2081,7 @@
           <a:p>
             <a:fld id="{1A473A71-948F-4AE8-AF79-80443CCFF2D0}" type="datetimeFigureOut">
               <a:rPr lang="de-DE" smtClean="0"/>
-              <a:t>26.02.2020</a:t>
+              <a:t>05.03.2020</a:t>
             </a:fld>
             <a:endParaRPr lang="de-DE"/>
           </a:p>
@@ -2390,7 +2392,7 @@
           <a:p>
             <a:fld id="{1A473A71-948F-4AE8-AF79-80443CCFF2D0}" type="datetimeFigureOut">
               <a:rPr lang="de-DE" smtClean="0"/>
-              <a:t>26.02.2020</a:t>
+              <a:t>05.03.2020</a:t>
             </a:fld>
             <a:endParaRPr lang="de-DE"/>
           </a:p>
@@ -2678,7 +2680,7 @@
           <a:p>
             <a:fld id="{1A473A71-948F-4AE8-AF79-80443CCFF2D0}" type="datetimeFigureOut">
               <a:rPr lang="de-DE" smtClean="0"/>
-              <a:t>26.02.2020</a:t>
+              <a:t>05.03.2020</a:t>
             </a:fld>
             <a:endParaRPr lang="de-DE"/>
           </a:p>
@@ -2919,7 +2921,7 @@
           <a:p>
             <a:fld id="{1A473A71-948F-4AE8-AF79-80443CCFF2D0}" type="datetimeFigureOut">
               <a:rPr lang="de-DE" smtClean="0"/>
-              <a:t>26.02.2020</a:t>
+              <a:t>05.03.2020</a:t>
             </a:fld>
             <a:endParaRPr lang="de-DE"/>
           </a:p>
@@ -3832,6 +3834,777 @@
     <p:extLst>
       <p:ext uri="{BB962C8B-B14F-4D97-AF65-F5344CB8AC3E}">
         <p14:creationId xmlns:p14="http://schemas.microsoft.com/office/powerpoint/2010/main" val="2552476434"/>
+      </p:ext>
+    </p:extLst>
+  </p:cSld>
+  <p:clrMapOvr>
+    <a:masterClrMapping/>
+  </p:clrMapOvr>
+</p:sld>
+</file>
+
+<file path=ppt/slides/slide12.xml><?xml version="1.0" encoding="utf-8"?>
+<p:sld xmlns:a="http://schemas.openxmlformats.org/drawingml/2006/main" xmlns:r="http://schemas.openxmlformats.org/officeDocument/2006/relationships" xmlns:p="http://schemas.openxmlformats.org/presentationml/2006/main">
+  <p:cSld>
+    <p:spTree>
+      <p:nvGrpSpPr>
+        <p:cNvPr id="1" name=""/>
+        <p:cNvGrpSpPr/>
+        <p:nvPr/>
+      </p:nvGrpSpPr>
+      <p:grpSpPr>
+        <a:xfrm>
+          <a:off x="0" y="0"/>
+          <a:ext cx="0" cy="0"/>
+          <a:chOff x="0" y="0"/>
+          <a:chExt cx="0" cy="0"/>
+        </a:xfrm>
+      </p:grpSpPr>
+      <p:pic>
+        <p:nvPicPr>
+          <p:cNvPr id="2" name="Grafik 1">
+            <a:extLst>
+              <a:ext uri="{FF2B5EF4-FFF2-40B4-BE49-F238E27FC236}">
+                <a16:creationId xmlns:a16="http://schemas.microsoft.com/office/drawing/2014/main" id="{19FFE53B-7A4D-4455-8764-DAFD44530654}"/>
+              </a:ext>
+            </a:extLst>
+          </p:cNvPr>
+          <p:cNvPicPr>
+            <a:picLocks noChangeAspect="1"/>
+          </p:cNvPicPr>
+          <p:nvPr/>
+        </p:nvPicPr>
+        <p:blipFill rotWithShape="1">
+          <a:blip r:embed="rId2"/>
+          <a:srcRect l="24781" t="22924" r="14401" b="8889"/>
+          <a:stretch/>
+        </p:blipFill>
+        <p:spPr>
+          <a:xfrm>
+            <a:off x="3174583" y="1190375"/>
+            <a:ext cx="6673517" cy="4676274"/>
+          </a:xfrm>
+          <a:prstGeom prst="rect">
+            <a:avLst/>
+          </a:prstGeom>
+        </p:spPr>
+      </p:pic>
+      <p:sp>
+        <p:nvSpPr>
+          <p:cNvPr id="3" name="Ellipse 2">
+            <a:extLst>
+              <a:ext uri="{FF2B5EF4-FFF2-40B4-BE49-F238E27FC236}">
+                <a16:creationId xmlns:a16="http://schemas.microsoft.com/office/drawing/2014/main" id="{4DF4B24D-8731-433B-BB25-02C4BF797EB8}"/>
+              </a:ext>
+            </a:extLst>
+          </p:cNvPr>
+          <p:cNvSpPr/>
+          <p:nvPr/>
+        </p:nvSpPr>
+        <p:spPr>
+          <a:xfrm>
+            <a:off x="7562850" y="3045316"/>
+            <a:ext cx="1006641" cy="1008000"/>
+          </a:xfrm>
+          <a:prstGeom prst="ellipse">
+            <a:avLst/>
+          </a:prstGeom>
+        </p:spPr>
+        <p:style>
+          <a:lnRef idx="2">
+            <a:schemeClr val="accent1">
+              <a:shade val="50000"/>
+            </a:schemeClr>
+          </a:lnRef>
+          <a:fillRef idx="1">
+            <a:schemeClr val="accent1"/>
+          </a:fillRef>
+          <a:effectRef idx="0">
+            <a:schemeClr val="accent1"/>
+          </a:effectRef>
+          <a:fontRef idx="minor">
+            <a:schemeClr val="lt1"/>
+          </a:fontRef>
+        </p:style>
+        <p:txBody>
+          <a:bodyPr rtlCol="0" anchor="ctr"/>
+          <a:lstStyle/>
+          <a:p>
+            <a:pPr algn="ctr"/>
+            <a:endParaRPr lang="de-DE"/>
+          </a:p>
+        </p:txBody>
+      </p:sp>
+      <p:sp>
+        <p:nvSpPr>
+          <p:cNvPr id="4" name="Ellipse 3">
+            <a:extLst>
+              <a:ext uri="{FF2B5EF4-FFF2-40B4-BE49-F238E27FC236}">
+                <a16:creationId xmlns:a16="http://schemas.microsoft.com/office/drawing/2014/main" id="{B2D5D523-02B6-4EA5-96E6-C4894249E109}"/>
+              </a:ext>
+            </a:extLst>
+          </p:cNvPr>
+          <p:cNvSpPr/>
+          <p:nvPr/>
+        </p:nvSpPr>
+        <p:spPr>
+          <a:xfrm>
+            <a:off x="7839578" y="3049327"/>
+            <a:ext cx="1006641" cy="1008000"/>
+          </a:xfrm>
+          <a:prstGeom prst="ellipse">
+            <a:avLst/>
+          </a:prstGeom>
+        </p:spPr>
+        <p:style>
+          <a:lnRef idx="2">
+            <a:schemeClr val="accent6">
+              <a:shade val="50000"/>
+            </a:schemeClr>
+          </a:lnRef>
+          <a:fillRef idx="1">
+            <a:schemeClr val="accent6"/>
+          </a:fillRef>
+          <a:effectRef idx="0">
+            <a:schemeClr val="accent6"/>
+          </a:effectRef>
+          <a:fontRef idx="minor">
+            <a:schemeClr val="lt1"/>
+          </a:fontRef>
+        </p:style>
+        <p:txBody>
+          <a:bodyPr rtlCol="0" anchor="ctr"/>
+          <a:lstStyle/>
+          <a:p>
+            <a:pPr algn="ctr"/>
+            <a:endParaRPr lang="de-DE"/>
+          </a:p>
+        </p:txBody>
+      </p:sp>
+      <p:sp>
+        <p:nvSpPr>
+          <p:cNvPr id="5" name="Ellipse 4">
+            <a:extLst>
+              <a:ext uri="{FF2B5EF4-FFF2-40B4-BE49-F238E27FC236}">
+                <a16:creationId xmlns:a16="http://schemas.microsoft.com/office/drawing/2014/main" id="{9487F51E-BB8A-4E91-BB24-3828217DD1E0}"/>
+              </a:ext>
+            </a:extLst>
+          </p:cNvPr>
+          <p:cNvSpPr/>
+          <p:nvPr/>
+        </p:nvSpPr>
+        <p:spPr>
+          <a:xfrm>
+            <a:off x="8116306" y="3053338"/>
+            <a:ext cx="1006641" cy="1008000"/>
+          </a:xfrm>
+          <a:prstGeom prst="ellipse">
+            <a:avLst/>
+          </a:prstGeom>
+        </p:spPr>
+        <p:style>
+          <a:lnRef idx="2">
+            <a:schemeClr val="accent2">
+              <a:shade val="50000"/>
+            </a:schemeClr>
+          </a:lnRef>
+          <a:fillRef idx="1">
+            <a:schemeClr val="accent2"/>
+          </a:fillRef>
+          <a:effectRef idx="0">
+            <a:schemeClr val="accent2"/>
+          </a:effectRef>
+          <a:fontRef idx="minor">
+            <a:schemeClr val="lt1"/>
+          </a:fontRef>
+        </p:style>
+        <p:txBody>
+          <a:bodyPr rtlCol="0" anchor="ctr"/>
+          <a:lstStyle/>
+          <a:p>
+            <a:pPr algn="ctr"/>
+            <a:endParaRPr lang="de-DE"/>
+          </a:p>
+        </p:txBody>
+      </p:sp>
+      <p:sp>
+        <p:nvSpPr>
+          <p:cNvPr id="6" name="Ellipse 5">
+            <a:extLst>
+              <a:ext uri="{FF2B5EF4-FFF2-40B4-BE49-F238E27FC236}">
+                <a16:creationId xmlns:a16="http://schemas.microsoft.com/office/drawing/2014/main" id="{40DE3F95-476E-4D80-AF9D-18772514A494}"/>
+              </a:ext>
+            </a:extLst>
+          </p:cNvPr>
+          <p:cNvSpPr/>
+          <p:nvPr/>
+        </p:nvSpPr>
+        <p:spPr>
+          <a:xfrm>
+            <a:off x="7486650" y="2815389"/>
+            <a:ext cx="1705476" cy="1483895"/>
+          </a:xfrm>
+          <a:prstGeom prst="ellipse">
+            <a:avLst/>
+          </a:prstGeom>
+          <a:noFill/>
+          <a:ln>
+            <a:solidFill>
+              <a:srgbClr val="C00000"/>
+            </a:solidFill>
+          </a:ln>
+        </p:spPr>
+        <p:style>
+          <a:lnRef idx="2">
+            <a:schemeClr val="accent1">
+              <a:shade val="50000"/>
+            </a:schemeClr>
+          </a:lnRef>
+          <a:fillRef idx="1">
+            <a:schemeClr val="accent1"/>
+          </a:fillRef>
+          <a:effectRef idx="0">
+            <a:schemeClr val="accent1"/>
+          </a:effectRef>
+          <a:fontRef idx="minor">
+            <a:schemeClr val="lt1"/>
+          </a:fontRef>
+        </p:style>
+        <p:txBody>
+          <a:bodyPr rtlCol="0" anchor="ctr"/>
+          <a:lstStyle/>
+          <a:p>
+            <a:pPr algn="ctr"/>
+            <a:endParaRPr lang="de-DE" dirty="0"/>
+          </a:p>
+        </p:txBody>
+      </p:sp>
+      <p:cxnSp>
+        <p:nvCxnSpPr>
+          <p:cNvPr id="8" name="Gerade Verbindung mit Pfeil 7">
+            <a:extLst>
+              <a:ext uri="{FF2B5EF4-FFF2-40B4-BE49-F238E27FC236}">
+                <a16:creationId xmlns:a16="http://schemas.microsoft.com/office/drawing/2014/main" id="{09F4948C-02E2-4388-9430-F9F91DB87739}"/>
+              </a:ext>
+            </a:extLst>
+          </p:cNvPr>
+          <p:cNvCxnSpPr>
+            <a:stCxn id="4" idx="2"/>
+            <a:endCxn id="5" idx="2"/>
+          </p:cNvCxnSpPr>
+          <p:nvPr/>
+        </p:nvCxnSpPr>
+        <p:spPr>
+          <a:xfrm>
+            <a:off x="7839578" y="3553327"/>
+            <a:ext cx="276728" cy="4011"/>
+          </a:xfrm>
+          <a:prstGeom prst="straightConnector1">
+            <a:avLst/>
+          </a:prstGeom>
+          <a:ln>
+            <a:headEnd type="triangle"/>
+            <a:tailEnd type="triangle"/>
+          </a:ln>
+        </p:spPr>
+        <p:style>
+          <a:lnRef idx="1">
+            <a:schemeClr val="dk1"/>
+          </a:lnRef>
+          <a:fillRef idx="0">
+            <a:schemeClr val="dk1"/>
+          </a:fillRef>
+          <a:effectRef idx="0">
+            <a:schemeClr val="dk1"/>
+          </a:effectRef>
+          <a:fontRef idx="minor">
+            <a:schemeClr val="tx1"/>
+          </a:fontRef>
+        </p:style>
+      </p:cxnSp>
+      <p:cxnSp>
+        <p:nvCxnSpPr>
+          <p:cNvPr id="9" name="Gerade Verbindung mit Pfeil 8">
+            <a:extLst>
+              <a:ext uri="{FF2B5EF4-FFF2-40B4-BE49-F238E27FC236}">
+                <a16:creationId xmlns:a16="http://schemas.microsoft.com/office/drawing/2014/main" id="{C924700B-0DD9-4349-AA8E-D7E6803D34BB}"/>
+              </a:ext>
+            </a:extLst>
+          </p:cNvPr>
+          <p:cNvCxnSpPr/>
+          <p:nvPr/>
+        </p:nvCxnSpPr>
+        <p:spPr>
+          <a:xfrm>
+            <a:off x="7562850" y="3549316"/>
+            <a:ext cx="276728" cy="4011"/>
+          </a:xfrm>
+          <a:prstGeom prst="straightConnector1">
+            <a:avLst/>
+          </a:prstGeom>
+          <a:ln>
+            <a:headEnd type="triangle"/>
+            <a:tailEnd type="triangle"/>
+          </a:ln>
+        </p:spPr>
+        <p:style>
+          <a:lnRef idx="1">
+            <a:schemeClr val="dk1"/>
+          </a:lnRef>
+          <a:fillRef idx="0">
+            <a:schemeClr val="dk1"/>
+          </a:fillRef>
+          <a:effectRef idx="0">
+            <a:schemeClr val="dk1"/>
+          </a:effectRef>
+          <a:fontRef idx="minor">
+            <a:schemeClr val="tx1"/>
+          </a:fontRef>
+        </p:style>
+      </p:cxnSp>
+      <p:sp>
+        <p:nvSpPr>
+          <p:cNvPr id="10" name="Textfeld 9">
+            <a:extLst>
+              <a:ext uri="{FF2B5EF4-FFF2-40B4-BE49-F238E27FC236}">
+                <a16:creationId xmlns:a16="http://schemas.microsoft.com/office/drawing/2014/main" id="{BCAFA0D6-40F4-414B-BCE7-109A4D969CC3}"/>
+              </a:ext>
+            </a:extLst>
+          </p:cNvPr>
+          <p:cNvSpPr txBox="1"/>
+          <p:nvPr/>
+        </p:nvSpPr>
+        <p:spPr>
+          <a:xfrm>
+            <a:off x="7522240" y="3275111"/>
+            <a:ext cx="433477" cy="307777"/>
+          </a:xfrm>
+          <a:prstGeom prst="rect">
+            <a:avLst/>
+          </a:prstGeom>
+          <a:noFill/>
+        </p:spPr>
+        <p:txBody>
+          <a:bodyPr wrap="square" rtlCol="0">
+            <a:spAutoFit/>
+          </a:bodyPr>
+          <a:lstStyle/>
+          <a:p>
+            <a:r>
+              <a:rPr lang="de-DE" sz="1400" dirty="0"/>
+              <a:t>10</a:t>
+            </a:r>
+          </a:p>
+        </p:txBody>
+      </p:sp>
+      <p:sp>
+        <p:nvSpPr>
+          <p:cNvPr id="11" name="Textfeld 10">
+            <a:extLst>
+              <a:ext uri="{FF2B5EF4-FFF2-40B4-BE49-F238E27FC236}">
+                <a16:creationId xmlns:a16="http://schemas.microsoft.com/office/drawing/2014/main" id="{21BBCC6B-D44E-4665-A7BC-36758D081D51}"/>
+              </a:ext>
+            </a:extLst>
+          </p:cNvPr>
+          <p:cNvSpPr txBox="1"/>
+          <p:nvPr/>
+        </p:nvSpPr>
+        <p:spPr>
+          <a:xfrm>
+            <a:off x="7797715" y="3275111"/>
+            <a:ext cx="433477" cy="307777"/>
+          </a:xfrm>
+          <a:prstGeom prst="rect">
+            <a:avLst/>
+          </a:prstGeom>
+          <a:noFill/>
+        </p:spPr>
+        <p:txBody>
+          <a:bodyPr wrap="square" rtlCol="0">
+            <a:spAutoFit/>
+          </a:bodyPr>
+          <a:lstStyle/>
+          <a:p>
+            <a:r>
+              <a:rPr lang="de-DE" sz="1400" dirty="0"/>
+              <a:t>10</a:t>
+            </a:r>
+          </a:p>
+        </p:txBody>
+      </p:sp>
+    </p:spTree>
+    <p:extLst>
+      <p:ext uri="{BB962C8B-B14F-4D97-AF65-F5344CB8AC3E}">
+        <p14:creationId xmlns:p14="http://schemas.microsoft.com/office/powerpoint/2010/main" val="1712495513"/>
+      </p:ext>
+    </p:extLst>
+  </p:cSld>
+  <p:clrMapOvr>
+    <a:masterClrMapping/>
+  </p:clrMapOvr>
+</p:sld>
+</file>
+
+<file path=ppt/slides/slide13.xml><?xml version="1.0" encoding="utf-8"?>
+<p:sld xmlns:a="http://schemas.openxmlformats.org/drawingml/2006/main" xmlns:r="http://schemas.openxmlformats.org/officeDocument/2006/relationships" xmlns:p="http://schemas.openxmlformats.org/presentationml/2006/main">
+  <p:cSld>
+    <p:spTree>
+      <p:nvGrpSpPr>
+        <p:cNvPr id="1" name=""/>
+        <p:cNvGrpSpPr/>
+        <p:nvPr/>
+      </p:nvGrpSpPr>
+      <p:grpSpPr>
+        <a:xfrm>
+          <a:off x="0" y="0"/>
+          <a:ext cx="0" cy="0"/>
+          <a:chOff x="0" y="0"/>
+          <a:chExt cx="0" cy="0"/>
+        </a:xfrm>
+      </p:grpSpPr>
+      <p:pic>
+        <p:nvPicPr>
+          <p:cNvPr id="2" name="Grafik 1">
+            <a:extLst>
+              <a:ext uri="{FF2B5EF4-FFF2-40B4-BE49-F238E27FC236}">
+                <a16:creationId xmlns:a16="http://schemas.microsoft.com/office/drawing/2014/main" id="{B4AE4394-6B0A-4468-AF1A-E9B4104D3DCB}"/>
+              </a:ext>
+            </a:extLst>
+          </p:cNvPr>
+          <p:cNvPicPr>
+            <a:picLocks noChangeAspect="1"/>
+          </p:cNvPicPr>
+          <p:nvPr/>
+        </p:nvPicPr>
+        <p:blipFill>
+          <a:blip r:embed="rId2"/>
+          <a:stretch>
+            <a:fillRect/>
+          </a:stretch>
+        </p:blipFill>
+        <p:spPr>
+          <a:xfrm>
+            <a:off x="2800350" y="1695450"/>
+            <a:ext cx="6591300" cy="3467100"/>
+          </a:xfrm>
+          <a:prstGeom prst="rect">
+            <a:avLst/>
+          </a:prstGeom>
+        </p:spPr>
+      </p:pic>
+      <p:cxnSp>
+        <p:nvCxnSpPr>
+          <p:cNvPr id="4" name="Gerader Verbinder 3">
+            <a:extLst>
+              <a:ext uri="{FF2B5EF4-FFF2-40B4-BE49-F238E27FC236}">
+                <a16:creationId xmlns:a16="http://schemas.microsoft.com/office/drawing/2014/main" id="{97E40FD7-5500-4134-8AF0-3F8F5C611ADF}"/>
+              </a:ext>
+            </a:extLst>
+          </p:cNvPr>
+          <p:cNvCxnSpPr>
+            <a:cxnSpLocks/>
+          </p:cNvCxnSpPr>
+          <p:nvPr/>
+        </p:nvCxnSpPr>
+        <p:spPr>
+          <a:xfrm>
+            <a:off x="5937250" y="1695450"/>
+            <a:ext cx="0" cy="3467100"/>
+          </a:xfrm>
+          <a:prstGeom prst="line">
+            <a:avLst/>
+          </a:prstGeom>
+          <a:ln w="19050">
+            <a:prstDash val="dashDot"/>
+          </a:ln>
+        </p:spPr>
+        <p:style>
+          <a:lnRef idx="1">
+            <a:schemeClr val="accent1"/>
+          </a:lnRef>
+          <a:fillRef idx="0">
+            <a:schemeClr val="accent1"/>
+          </a:fillRef>
+          <a:effectRef idx="0">
+            <a:schemeClr val="accent1"/>
+          </a:effectRef>
+          <a:fontRef idx="minor">
+            <a:schemeClr val="tx1"/>
+          </a:fontRef>
+        </p:style>
+      </p:cxnSp>
+      <p:cxnSp>
+        <p:nvCxnSpPr>
+          <p:cNvPr id="6" name="Gerade Verbindung mit Pfeil 5">
+            <a:extLst>
+              <a:ext uri="{FF2B5EF4-FFF2-40B4-BE49-F238E27FC236}">
+                <a16:creationId xmlns:a16="http://schemas.microsoft.com/office/drawing/2014/main" id="{AC5D6E0E-E252-45CB-ACC5-69A08E833DB8}"/>
+              </a:ext>
+            </a:extLst>
+          </p:cNvPr>
+          <p:cNvCxnSpPr/>
+          <p:nvPr/>
+        </p:nvCxnSpPr>
+        <p:spPr>
+          <a:xfrm>
+            <a:off x="5251450" y="3060700"/>
+            <a:ext cx="1377950" cy="0"/>
+          </a:xfrm>
+          <a:prstGeom prst="straightConnector1">
+            <a:avLst/>
+          </a:prstGeom>
+          <a:ln>
+            <a:headEnd type="triangle"/>
+            <a:tailEnd type="triangle"/>
+          </a:ln>
+        </p:spPr>
+        <p:style>
+          <a:lnRef idx="1">
+            <a:schemeClr val="dk1"/>
+          </a:lnRef>
+          <a:fillRef idx="0">
+            <a:schemeClr val="dk1"/>
+          </a:fillRef>
+          <a:effectRef idx="0">
+            <a:schemeClr val="dk1"/>
+          </a:effectRef>
+          <a:fontRef idx="minor">
+            <a:schemeClr val="tx1"/>
+          </a:fontRef>
+        </p:style>
+      </p:cxnSp>
+      <p:sp>
+        <p:nvSpPr>
+          <p:cNvPr id="7" name="Textfeld 6">
+            <a:extLst>
+              <a:ext uri="{FF2B5EF4-FFF2-40B4-BE49-F238E27FC236}">
+                <a16:creationId xmlns:a16="http://schemas.microsoft.com/office/drawing/2014/main" id="{879E7FC5-7DBC-4819-B75E-2A0A39710BA2}"/>
+              </a:ext>
+            </a:extLst>
+          </p:cNvPr>
+          <p:cNvSpPr txBox="1"/>
+          <p:nvPr/>
+        </p:nvSpPr>
+        <p:spPr>
+          <a:xfrm>
+            <a:off x="5445125" y="2691368"/>
+            <a:ext cx="984250" cy="369332"/>
+          </a:xfrm>
+          <a:prstGeom prst="rect">
+            <a:avLst/>
+          </a:prstGeom>
+          <a:solidFill>
+            <a:srgbClr val="A3B6BB"/>
+          </a:solidFill>
+        </p:spPr>
+        <p:txBody>
+          <a:bodyPr wrap="square" rtlCol="0">
+            <a:spAutoFit/>
+          </a:bodyPr>
+          <a:lstStyle/>
+          <a:p>
+            <a:r>
+              <a:rPr lang="de-DE" dirty="0"/>
+              <a:t>max. 80</a:t>
+            </a:r>
+          </a:p>
+        </p:txBody>
+      </p:sp>
+      <p:cxnSp>
+        <p:nvCxnSpPr>
+          <p:cNvPr id="9" name="Gerade Verbindung mit Pfeil 8">
+            <a:extLst>
+              <a:ext uri="{FF2B5EF4-FFF2-40B4-BE49-F238E27FC236}">
+                <a16:creationId xmlns:a16="http://schemas.microsoft.com/office/drawing/2014/main" id="{81C65700-ACEF-4401-B0B9-831BF796B16D}"/>
+              </a:ext>
+            </a:extLst>
+          </p:cNvPr>
+          <p:cNvCxnSpPr/>
+          <p:nvPr/>
+        </p:nvCxnSpPr>
+        <p:spPr>
+          <a:xfrm flipV="1">
+            <a:off x="7181850" y="2324100"/>
+            <a:ext cx="0" cy="2838450"/>
+          </a:xfrm>
+          <a:prstGeom prst="straightConnector1">
+            <a:avLst/>
+          </a:prstGeom>
+          <a:ln>
+            <a:tailEnd type="triangle"/>
+          </a:ln>
+        </p:spPr>
+        <p:style>
+          <a:lnRef idx="1">
+            <a:schemeClr val="dk1"/>
+          </a:lnRef>
+          <a:fillRef idx="0">
+            <a:schemeClr val="dk1"/>
+          </a:fillRef>
+          <a:effectRef idx="0">
+            <a:schemeClr val="dk1"/>
+          </a:effectRef>
+          <a:fontRef idx="minor">
+            <a:schemeClr val="tx1"/>
+          </a:fontRef>
+        </p:style>
+      </p:cxnSp>
+      <p:sp>
+        <p:nvSpPr>
+          <p:cNvPr id="11" name="Textfeld 10">
+            <a:extLst>
+              <a:ext uri="{FF2B5EF4-FFF2-40B4-BE49-F238E27FC236}">
+                <a16:creationId xmlns:a16="http://schemas.microsoft.com/office/drawing/2014/main" id="{E19D294B-4715-45F8-8F21-D6CF0802C61E}"/>
+              </a:ext>
+            </a:extLst>
+          </p:cNvPr>
+          <p:cNvSpPr txBox="1"/>
+          <p:nvPr/>
+        </p:nvSpPr>
+        <p:spPr>
+          <a:xfrm>
+            <a:off x="6673851" y="3248025"/>
+            <a:ext cx="461665" cy="1258325"/>
+          </a:xfrm>
+          <a:prstGeom prst="rect">
+            <a:avLst/>
+          </a:prstGeom>
+          <a:solidFill>
+            <a:srgbClr val="3E4547"/>
+          </a:solidFill>
+        </p:spPr>
+        <p:txBody>
+          <a:bodyPr vert="vert270" wrap="square" rtlCol="0">
+            <a:spAutoFit/>
+          </a:bodyPr>
+          <a:lstStyle/>
+          <a:p>
+            <a:r>
+              <a:rPr lang="de-DE" dirty="0"/>
+              <a:t>max. Ø 619</a:t>
+            </a:r>
+          </a:p>
+        </p:txBody>
+      </p:sp>
+      <p:cxnSp>
+        <p:nvCxnSpPr>
+          <p:cNvPr id="15" name="Gerade Verbindung mit Pfeil 14">
+            <a:extLst>
+              <a:ext uri="{FF2B5EF4-FFF2-40B4-BE49-F238E27FC236}">
+                <a16:creationId xmlns:a16="http://schemas.microsoft.com/office/drawing/2014/main" id="{19210659-0C69-4FFD-9846-421D5EEFF6DA}"/>
+              </a:ext>
+            </a:extLst>
+          </p:cNvPr>
+          <p:cNvCxnSpPr/>
+          <p:nvPr/>
+        </p:nvCxnSpPr>
+        <p:spPr>
+          <a:xfrm flipV="1">
+            <a:off x="6556375" y="2324100"/>
+            <a:ext cx="0" cy="158750"/>
+          </a:xfrm>
+          <a:prstGeom prst="straightConnector1">
+            <a:avLst/>
+          </a:prstGeom>
+          <a:ln>
+            <a:tailEnd type="triangle"/>
+          </a:ln>
+        </p:spPr>
+        <p:style>
+          <a:lnRef idx="1">
+            <a:schemeClr val="dk1"/>
+          </a:lnRef>
+          <a:fillRef idx="0">
+            <a:schemeClr val="dk1"/>
+          </a:fillRef>
+          <a:effectRef idx="0">
+            <a:schemeClr val="dk1"/>
+          </a:effectRef>
+          <a:fontRef idx="minor">
+            <a:schemeClr val="tx1"/>
+          </a:fontRef>
+        </p:style>
+      </p:cxnSp>
+      <p:cxnSp>
+        <p:nvCxnSpPr>
+          <p:cNvPr id="17" name="Gerade Verbindung mit Pfeil 16">
+            <a:extLst>
+              <a:ext uri="{FF2B5EF4-FFF2-40B4-BE49-F238E27FC236}">
+                <a16:creationId xmlns:a16="http://schemas.microsoft.com/office/drawing/2014/main" id="{A7F50003-F7AB-4460-8744-A1A514C780ED}"/>
+              </a:ext>
+            </a:extLst>
+          </p:cNvPr>
+          <p:cNvCxnSpPr>
+            <a:cxnSpLocks/>
+          </p:cNvCxnSpPr>
+          <p:nvPr/>
+        </p:nvCxnSpPr>
+        <p:spPr>
+          <a:xfrm>
+            <a:off x="6550025" y="1746250"/>
+            <a:ext cx="0" cy="476250"/>
+          </a:xfrm>
+          <a:prstGeom prst="straightConnector1">
+            <a:avLst/>
+          </a:prstGeom>
+          <a:ln>
+            <a:tailEnd type="triangle"/>
+          </a:ln>
+        </p:spPr>
+        <p:style>
+          <a:lnRef idx="1">
+            <a:schemeClr val="dk1"/>
+          </a:lnRef>
+          <a:fillRef idx="0">
+            <a:schemeClr val="dk1"/>
+          </a:fillRef>
+          <a:effectRef idx="0">
+            <a:schemeClr val="dk1"/>
+          </a:effectRef>
+          <a:fontRef idx="minor">
+            <a:schemeClr val="tx1"/>
+          </a:fontRef>
+        </p:style>
+      </p:cxnSp>
+      <p:sp>
+        <p:nvSpPr>
+          <p:cNvPr id="19" name="Textfeld 18">
+            <a:extLst>
+              <a:ext uri="{FF2B5EF4-FFF2-40B4-BE49-F238E27FC236}">
+                <a16:creationId xmlns:a16="http://schemas.microsoft.com/office/drawing/2014/main" id="{31117B71-04BB-4E1F-BDF5-EA12B76FEF46}"/>
+              </a:ext>
+            </a:extLst>
+          </p:cNvPr>
+          <p:cNvSpPr txBox="1"/>
+          <p:nvPr/>
+        </p:nvSpPr>
+        <p:spPr>
+          <a:xfrm>
+            <a:off x="6198542" y="1676919"/>
+            <a:ext cx="461665" cy="369332"/>
+          </a:xfrm>
+          <a:prstGeom prst="rect">
+            <a:avLst/>
+          </a:prstGeom>
+          <a:noFill/>
+        </p:spPr>
+        <p:txBody>
+          <a:bodyPr vert="vert270" wrap="square" rtlCol="0">
+            <a:spAutoFit/>
+          </a:bodyPr>
+          <a:lstStyle/>
+          <a:p>
+            <a:r>
+              <a:rPr lang="de-DE" dirty="0"/>
+              <a:t>5</a:t>
+            </a:r>
+          </a:p>
+        </p:txBody>
+      </p:sp>
+    </p:spTree>
+    <p:extLst>
+      <p:ext uri="{BB962C8B-B14F-4D97-AF65-F5344CB8AC3E}">
+        <p14:creationId xmlns:p14="http://schemas.microsoft.com/office/powerpoint/2010/main" val="3863845191"/>
       </p:ext>
     </p:extLst>
   </p:cSld>

</xml_diff>

<commit_message>
Projektbericht formatiert und korrigiert
</commit_message>
<xml_diff>
--- a/Grafiken.pptx
+++ b/Grafiken.pptx
@@ -22,7 +22,10 @@
     <p:sldId id="270" r:id="rId16"/>
     <p:sldId id="271" r:id="rId17"/>
     <p:sldId id="272" r:id="rId18"/>
-    <p:sldId id="273" r:id="rId19"/>
+    <p:sldId id="275" r:id="rId19"/>
+    <p:sldId id="273" r:id="rId20"/>
+    <p:sldId id="274" r:id="rId21"/>
+    <p:sldId id="276" r:id="rId22"/>
   </p:sldIdLst>
   <p:sldSz cx="12192000" cy="6858000"/>
   <p:notesSz cx="6858000" cy="9144000"/>
@@ -276,7 +279,7 @@
           <a:p>
             <a:fld id="{1A473A71-948F-4AE8-AF79-80443CCFF2D0}" type="datetimeFigureOut">
               <a:rPr lang="de-DE" smtClean="0"/>
-              <a:t>05.03.2020</a:t>
+              <a:t>07.03.2020</a:t>
             </a:fld>
             <a:endParaRPr lang="de-DE"/>
           </a:p>
@@ -474,7 +477,7 @@
           <a:p>
             <a:fld id="{1A473A71-948F-4AE8-AF79-80443CCFF2D0}" type="datetimeFigureOut">
               <a:rPr lang="de-DE" smtClean="0"/>
-              <a:t>05.03.2020</a:t>
+              <a:t>07.03.2020</a:t>
             </a:fld>
             <a:endParaRPr lang="de-DE"/>
           </a:p>
@@ -682,7 +685,7 @@
           <a:p>
             <a:fld id="{1A473A71-948F-4AE8-AF79-80443CCFF2D0}" type="datetimeFigureOut">
               <a:rPr lang="de-DE" smtClean="0"/>
-              <a:t>05.03.2020</a:t>
+              <a:t>07.03.2020</a:t>
             </a:fld>
             <a:endParaRPr lang="de-DE"/>
           </a:p>
@@ -880,7 +883,7 @@
           <a:p>
             <a:fld id="{1A473A71-948F-4AE8-AF79-80443CCFF2D0}" type="datetimeFigureOut">
               <a:rPr lang="de-DE" smtClean="0"/>
-              <a:t>05.03.2020</a:t>
+              <a:t>07.03.2020</a:t>
             </a:fld>
             <a:endParaRPr lang="de-DE"/>
           </a:p>
@@ -1155,7 +1158,7 @@
           <a:p>
             <a:fld id="{1A473A71-948F-4AE8-AF79-80443CCFF2D0}" type="datetimeFigureOut">
               <a:rPr lang="de-DE" smtClean="0"/>
-              <a:t>05.03.2020</a:t>
+              <a:t>07.03.2020</a:t>
             </a:fld>
             <a:endParaRPr lang="de-DE"/>
           </a:p>
@@ -1420,7 +1423,7 @@
           <a:p>
             <a:fld id="{1A473A71-948F-4AE8-AF79-80443CCFF2D0}" type="datetimeFigureOut">
               <a:rPr lang="de-DE" smtClean="0"/>
-              <a:t>05.03.2020</a:t>
+              <a:t>07.03.2020</a:t>
             </a:fld>
             <a:endParaRPr lang="de-DE"/>
           </a:p>
@@ -1832,7 +1835,7 @@
           <a:p>
             <a:fld id="{1A473A71-948F-4AE8-AF79-80443CCFF2D0}" type="datetimeFigureOut">
               <a:rPr lang="de-DE" smtClean="0"/>
-              <a:t>05.03.2020</a:t>
+              <a:t>07.03.2020</a:t>
             </a:fld>
             <a:endParaRPr lang="de-DE"/>
           </a:p>
@@ -1973,7 +1976,7 @@
           <a:p>
             <a:fld id="{1A473A71-948F-4AE8-AF79-80443CCFF2D0}" type="datetimeFigureOut">
               <a:rPr lang="de-DE" smtClean="0"/>
-              <a:t>05.03.2020</a:t>
+              <a:t>07.03.2020</a:t>
             </a:fld>
             <a:endParaRPr lang="de-DE"/>
           </a:p>
@@ -2086,7 +2089,7 @@
           <a:p>
             <a:fld id="{1A473A71-948F-4AE8-AF79-80443CCFF2D0}" type="datetimeFigureOut">
               <a:rPr lang="de-DE" smtClean="0"/>
-              <a:t>05.03.2020</a:t>
+              <a:t>07.03.2020</a:t>
             </a:fld>
             <a:endParaRPr lang="de-DE"/>
           </a:p>
@@ -2397,7 +2400,7 @@
           <a:p>
             <a:fld id="{1A473A71-948F-4AE8-AF79-80443CCFF2D0}" type="datetimeFigureOut">
               <a:rPr lang="de-DE" smtClean="0"/>
-              <a:t>05.03.2020</a:t>
+              <a:t>07.03.2020</a:t>
             </a:fld>
             <a:endParaRPr lang="de-DE"/>
           </a:p>
@@ -2685,7 +2688,7 @@
           <a:p>
             <a:fld id="{1A473A71-948F-4AE8-AF79-80443CCFF2D0}" type="datetimeFigureOut">
               <a:rPr lang="de-DE" smtClean="0"/>
-              <a:t>05.03.2020</a:t>
+              <a:t>07.03.2020</a:t>
             </a:fld>
             <a:endParaRPr lang="de-DE"/>
           </a:p>
@@ -2926,7 +2929,7 @@
           <a:p>
             <a:fld id="{1A473A71-948F-4AE8-AF79-80443CCFF2D0}" type="datetimeFigureOut">
               <a:rPr lang="de-DE" smtClean="0"/>
-              <a:t>05.03.2020</a:t>
+              <a:t>07.03.2020</a:t>
             </a:fld>
             <a:endParaRPr lang="de-DE"/>
           </a:p>
@@ -6510,6 +6513,336 @@
           <p:cNvPr id="2" name="Grafik 1">
             <a:extLst>
               <a:ext uri="{FF2B5EF4-FFF2-40B4-BE49-F238E27FC236}">
+                <a16:creationId xmlns:a16="http://schemas.microsoft.com/office/drawing/2014/main" id="{9F3B7CDC-E3AB-49D2-9C6C-9FB62EE6BD47}"/>
+              </a:ext>
+            </a:extLst>
+          </p:cNvPr>
+          <p:cNvPicPr>
+            <a:picLocks noChangeAspect="1"/>
+          </p:cNvPicPr>
+          <p:nvPr/>
+        </p:nvPicPr>
+        <p:blipFill>
+          <a:blip r:embed="rId2"/>
+          <a:stretch>
+            <a:fillRect/>
+          </a:stretch>
+        </p:blipFill>
+        <p:spPr>
+          <a:xfrm>
+            <a:off x="1596200" y="0"/>
+            <a:ext cx="8847199" cy="6858000"/>
+          </a:xfrm>
+          <a:prstGeom prst="rect">
+            <a:avLst/>
+          </a:prstGeom>
+        </p:spPr>
+      </p:pic>
+      <p:sp>
+        <p:nvSpPr>
+          <p:cNvPr id="4" name="Textfeld 3">
+            <a:extLst>
+              <a:ext uri="{FF2B5EF4-FFF2-40B4-BE49-F238E27FC236}">
+                <a16:creationId xmlns:a16="http://schemas.microsoft.com/office/drawing/2014/main" id="{66BA9ACA-642D-4FA6-95E6-7188E38DD7D6}"/>
+              </a:ext>
+            </a:extLst>
+          </p:cNvPr>
+          <p:cNvSpPr txBox="1"/>
+          <p:nvPr/>
+        </p:nvSpPr>
+        <p:spPr>
+          <a:xfrm>
+            <a:off x="1733550" y="3672840"/>
+            <a:ext cx="307777" cy="765572"/>
+          </a:xfrm>
+          <a:prstGeom prst="rect">
+            <a:avLst/>
+          </a:prstGeom>
+          <a:solidFill>
+            <a:schemeClr val="bg1"/>
+          </a:solidFill>
+        </p:spPr>
+        <p:txBody>
+          <a:bodyPr vert="vert270" wrap="square" rIns="0" rtlCol="0">
+            <a:spAutoFit/>
+          </a:bodyPr>
+          <a:lstStyle/>
+          <a:p>
+            <a:r>
+              <a:rPr lang="de-DE" sz="1400" dirty="0"/>
+              <a:t>Ø 770</a:t>
+            </a:r>
+          </a:p>
+        </p:txBody>
+      </p:sp>
+      <p:sp>
+        <p:nvSpPr>
+          <p:cNvPr id="5" name="Textfeld 4">
+            <a:extLst>
+              <a:ext uri="{FF2B5EF4-FFF2-40B4-BE49-F238E27FC236}">
+                <a16:creationId xmlns:a16="http://schemas.microsoft.com/office/drawing/2014/main" id="{FBF263C7-C38F-49DE-AE2C-9453A804AD32}"/>
+              </a:ext>
+            </a:extLst>
+          </p:cNvPr>
+          <p:cNvSpPr txBox="1"/>
+          <p:nvPr/>
+        </p:nvSpPr>
+        <p:spPr>
+          <a:xfrm>
+            <a:off x="2284095" y="4899660"/>
+            <a:ext cx="307777" cy="613172"/>
+          </a:xfrm>
+          <a:prstGeom prst="rect">
+            <a:avLst/>
+          </a:prstGeom>
+          <a:solidFill>
+            <a:schemeClr val="bg1"/>
+          </a:solidFill>
+        </p:spPr>
+        <p:txBody>
+          <a:bodyPr vert="vert270" wrap="square" rIns="0" rtlCol="0">
+            <a:spAutoFit/>
+          </a:bodyPr>
+          <a:lstStyle/>
+          <a:p>
+            <a:r>
+              <a:rPr lang="de-DE" sz="1400" dirty="0"/>
+              <a:t>385</a:t>
+            </a:r>
+          </a:p>
+        </p:txBody>
+      </p:sp>
+      <p:sp>
+        <p:nvSpPr>
+          <p:cNvPr id="6" name="Textfeld 5">
+            <a:extLst>
+              <a:ext uri="{FF2B5EF4-FFF2-40B4-BE49-F238E27FC236}">
+                <a16:creationId xmlns:a16="http://schemas.microsoft.com/office/drawing/2014/main" id="{3D787434-9AF8-4585-B74C-9DDD9467549E}"/>
+              </a:ext>
+            </a:extLst>
+          </p:cNvPr>
+          <p:cNvSpPr txBox="1"/>
+          <p:nvPr/>
+        </p:nvSpPr>
+        <p:spPr>
+          <a:xfrm>
+            <a:off x="2838450" y="4832985"/>
+            <a:ext cx="307777" cy="765572"/>
+          </a:xfrm>
+          <a:prstGeom prst="rect">
+            <a:avLst/>
+          </a:prstGeom>
+          <a:solidFill>
+            <a:schemeClr val="bg1"/>
+          </a:solidFill>
+        </p:spPr>
+        <p:txBody>
+          <a:bodyPr vert="vert270" wrap="square" rIns="0" rtlCol="0">
+            <a:spAutoFit/>
+          </a:bodyPr>
+          <a:lstStyle/>
+          <a:p>
+            <a:r>
+              <a:rPr lang="de-DE" sz="1400" dirty="0"/>
+              <a:t>322,5</a:t>
+            </a:r>
+          </a:p>
+        </p:txBody>
+      </p:sp>
+      <p:sp>
+        <p:nvSpPr>
+          <p:cNvPr id="8" name="Rechteck 7">
+            <a:extLst>
+              <a:ext uri="{FF2B5EF4-FFF2-40B4-BE49-F238E27FC236}">
+                <a16:creationId xmlns:a16="http://schemas.microsoft.com/office/drawing/2014/main" id="{3577D2CE-4D04-4810-B72A-AAB4B9245CDD}"/>
+              </a:ext>
+            </a:extLst>
+          </p:cNvPr>
+          <p:cNvSpPr/>
+          <p:nvPr/>
+        </p:nvSpPr>
+        <p:spPr>
+          <a:xfrm>
+            <a:off x="2717362" y="6157911"/>
+            <a:ext cx="426839" cy="211097"/>
+          </a:xfrm>
+          <a:prstGeom prst="rect">
+            <a:avLst/>
+          </a:prstGeom>
+          <a:solidFill>
+            <a:schemeClr val="bg1"/>
+          </a:solidFill>
+          <a:ln>
+            <a:solidFill>
+              <a:schemeClr val="bg1"/>
+            </a:solidFill>
+          </a:ln>
+        </p:spPr>
+        <p:style>
+          <a:lnRef idx="2">
+            <a:schemeClr val="accent1">
+              <a:shade val="50000"/>
+            </a:schemeClr>
+          </a:lnRef>
+          <a:fillRef idx="1">
+            <a:schemeClr val="accent1"/>
+          </a:fillRef>
+          <a:effectRef idx="0">
+            <a:schemeClr val="accent1"/>
+          </a:effectRef>
+          <a:fontRef idx="minor">
+            <a:schemeClr val="lt1"/>
+          </a:fontRef>
+        </p:style>
+        <p:txBody>
+          <a:bodyPr rtlCol="0" anchor="ctr"/>
+          <a:lstStyle/>
+          <a:p>
+            <a:pPr algn="ctr"/>
+            <a:endParaRPr lang="de-DE"/>
+          </a:p>
+        </p:txBody>
+      </p:sp>
+      <p:sp>
+        <p:nvSpPr>
+          <p:cNvPr id="7" name="Textfeld 6">
+            <a:extLst>
+              <a:ext uri="{FF2B5EF4-FFF2-40B4-BE49-F238E27FC236}">
+                <a16:creationId xmlns:a16="http://schemas.microsoft.com/office/drawing/2014/main" id="{3E598941-AD98-40D9-8D3F-62894D2D1160}"/>
+              </a:ext>
+            </a:extLst>
+          </p:cNvPr>
+          <p:cNvSpPr txBox="1"/>
+          <p:nvPr/>
+        </p:nvSpPr>
+        <p:spPr>
+          <a:xfrm>
+            <a:off x="2928757" y="6100763"/>
+            <a:ext cx="215444" cy="330157"/>
+          </a:xfrm>
+          <a:prstGeom prst="rect">
+            <a:avLst/>
+          </a:prstGeom>
+          <a:noFill/>
+        </p:spPr>
+        <p:txBody>
+          <a:bodyPr vert="vert270" wrap="square" lIns="0" tIns="0" rIns="0" bIns="0" rtlCol="0">
+            <a:spAutoFit/>
+          </a:bodyPr>
+          <a:lstStyle/>
+          <a:p>
+            <a:r>
+              <a:rPr lang="de-DE" sz="1400" dirty="0"/>
+              <a:t>62,5</a:t>
+            </a:r>
+          </a:p>
+        </p:txBody>
+      </p:sp>
+      <p:sp>
+        <p:nvSpPr>
+          <p:cNvPr id="3" name="Textfeld 2">
+            <a:extLst>
+              <a:ext uri="{FF2B5EF4-FFF2-40B4-BE49-F238E27FC236}">
+                <a16:creationId xmlns:a16="http://schemas.microsoft.com/office/drawing/2014/main" id="{9D9E13ED-6E26-4E9C-9F1D-61B192315D95}"/>
+              </a:ext>
+            </a:extLst>
+          </p:cNvPr>
+          <p:cNvSpPr txBox="1"/>
+          <p:nvPr/>
+        </p:nvSpPr>
+        <p:spPr>
+          <a:xfrm>
+            <a:off x="7600427" y="6100763"/>
+            <a:ext cx="1979802" cy="369332"/>
+          </a:xfrm>
+          <a:prstGeom prst="rect">
+            <a:avLst/>
+          </a:prstGeom>
+          <a:noFill/>
+        </p:spPr>
+        <p:txBody>
+          <a:bodyPr wrap="square" rtlCol="0">
+            <a:spAutoFit/>
+          </a:bodyPr>
+          <a:lstStyle/>
+          <a:p>
+            <a:r>
+              <a:rPr lang="de-DE" dirty="0"/>
+              <a:t>Schienenoberkante</a:t>
+            </a:r>
+          </a:p>
+        </p:txBody>
+      </p:sp>
+      <p:sp>
+        <p:nvSpPr>
+          <p:cNvPr id="9" name="Textfeld 8">
+            <a:extLst>
+              <a:ext uri="{FF2B5EF4-FFF2-40B4-BE49-F238E27FC236}">
+                <a16:creationId xmlns:a16="http://schemas.microsoft.com/office/drawing/2014/main" id="{1FDFA633-C2D4-45C5-B7DF-8AE98B79B956}"/>
+              </a:ext>
+            </a:extLst>
+          </p:cNvPr>
+          <p:cNvSpPr txBox="1"/>
+          <p:nvPr/>
+        </p:nvSpPr>
+        <p:spPr>
+          <a:xfrm>
+            <a:off x="4035105" y="1661020"/>
+            <a:ext cx="1082180" cy="369332"/>
+          </a:xfrm>
+          <a:prstGeom prst="rect">
+            <a:avLst/>
+          </a:prstGeom>
+          <a:noFill/>
+        </p:spPr>
+        <p:txBody>
+          <a:bodyPr wrap="square" rtlCol="0">
+            <a:spAutoFit/>
+          </a:bodyPr>
+          <a:lstStyle/>
+          <a:p>
+            <a:r>
+              <a:rPr lang="de-DE" dirty="0"/>
+              <a:t>Laufrad</a:t>
+            </a:r>
+          </a:p>
+        </p:txBody>
+      </p:sp>
+    </p:spTree>
+    <p:extLst>
+      <p:ext uri="{BB962C8B-B14F-4D97-AF65-F5344CB8AC3E}">
+        <p14:creationId xmlns:p14="http://schemas.microsoft.com/office/powerpoint/2010/main" val="484038559"/>
+      </p:ext>
+    </p:extLst>
+  </p:cSld>
+  <p:clrMapOvr>
+    <a:masterClrMapping/>
+  </p:clrMapOvr>
+</p:sld>
+</file>
+
+<file path=ppt/slides/slide19.xml><?xml version="1.0" encoding="utf-8"?>
+<p:sld xmlns:a="http://schemas.openxmlformats.org/drawingml/2006/main" xmlns:r="http://schemas.openxmlformats.org/officeDocument/2006/relationships" xmlns:p="http://schemas.openxmlformats.org/presentationml/2006/main">
+  <p:cSld>
+    <p:spTree>
+      <p:nvGrpSpPr>
+        <p:cNvPr id="1" name=""/>
+        <p:cNvGrpSpPr/>
+        <p:nvPr/>
+      </p:nvGrpSpPr>
+      <p:grpSpPr>
+        <a:xfrm>
+          <a:off x="0" y="0"/>
+          <a:ext cx="0" cy="0"/>
+          <a:chOff x="0" y="0"/>
+          <a:chExt cx="0" cy="0"/>
+        </a:xfrm>
+      </p:grpSpPr>
+      <p:pic>
+        <p:nvPicPr>
+          <p:cNvPr id="2" name="Grafik 1">
+            <a:extLst>
+              <a:ext uri="{FF2B5EF4-FFF2-40B4-BE49-F238E27FC236}">
                 <a16:creationId xmlns:a16="http://schemas.microsoft.com/office/drawing/2014/main" id="{D7B3BB5C-C892-404D-883E-721ACC2791ED}"/>
               </a:ext>
             </a:extLst>
@@ -7549,6 +7882,266 @@
     <p:extLst>
       <p:ext uri="{BB962C8B-B14F-4D97-AF65-F5344CB8AC3E}">
         <p14:creationId xmlns:p14="http://schemas.microsoft.com/office/powerpoint/2010/main" val="1064748203"/>
+      </p:ext>
+    </p:extLst>
+  </p:cSld>
+  <p:clrMapOvr>
+    <a:masterClrMapping/>
+  </p:clrMapOvr>
+</p:sld>
+</file>
+
+<file path=ppt/slides/slide20.xml><?xml version="1.0" encoding="utf-8"?>
+<p:sld xmlns:a="http://schemas.openxmlformats.org/drawingml/2006/main" xmlns:r="http://schemas.openxmlformats.org/officeDocument/2006/relationships" xmlns:p="http://schemas.openxmlformats.org/presentationml/2006/main">
+  <p:cSld>
+    <p:spTree>
+      <p:nvGrpSpPr>
+        <p:cNvPr id="1" name=""/>
+        <p:cNvGrpSpPr/>
+        <p:nvPr/>
+      </p:nvGrpSpPr>
+      <p:grpSpPr>
+        <a:xfrm>
+          <a:off x="0" y="0"/>
+          <a:ext cx="0" cy="0"/>
+          <a:chOff x="0" y="0"/>
+          <a:chExt cx="0" cy="0"/>
+        </a:xfrm>
+      </p:grpSpPr>
+      <p:pic>
+        <p:nvPicPr>
+          <p:cNvPr id="2" name="Grafik 1">
+            <a:extLst>
+              <a:ext uri="{FF2B5EF4-FFF2-40B4-BE49-F238E27FC236}">
+                <a16:creationId xmlns:a16="http://schemas.microsoft.com/office/drawing/2014/main" id="{04D9AE76-C98F-4241-9DAD-54417979EADF}"/>
+              </a:ext>
+            </a:extLst>
+          </p:cNvPr>
+          <p:cNvPicPr/>
+          <p:nvPr/>
+        </p:nvPicPr>
+        <p:blipFill>
+          <a:blip r:embed="rId2"/>
+          <a:stretch>
+            <a:fillRect/>
+          </a:stretch>
+        </p:blipFill>
+        <p:spPr>
+          <a:xfrm>
+            <a:off x="3328987" y="455930"/>
+            <a:ext cx="5534025" cy="5946140"/>
+          </a:xfrm>
+          <a:prstGeom prst="rect">
+            <a:avLst/>
+          </a:prstGeom>
+        </p:spPr>
+      </p:pic>
+      <p:cxnSp>
+        <p:nvCxnSpPr>
+          <p:cNvPr id="4" name="Gerade Verbindung mit Pfeil 3">
+            <a:extLst>
+              <a:ext uri="{FF2B5EF4-FFF2-40B4-BE49-F238E27FC236}">
+                <a16:creationId xmlns:a16="http://schemas.microsoft.com/office/drawing/2014/main" id="{8D5B2ACF-269F-4145-974C-1F69F1E7E3C8}"/>
+              </a:ext>
+            </a:extLst>
+          </p:cNvPr>
+          <p:cNvCxnSpPr>
+            <a:cxnSpLocks/>
+          </p:cNvCxnSpPr>
+          <p:nvPr/>
+        </p:nvCxnSpPr>
+        <p:spPr>
+          <a:xfrm>
+            <a:off x="5108895" y="2474753"/>
+            <a:ext cx="1174458" cy="0"/>
+          </a:xfrm>
+          <a:prstGeom prst="straightConnector1">
+            <a:avLst/>
+          </a:prstGeom>
+          <a:ln w="57150">
+            <a:solidFill>
+              <a:srgbClr val="C00000"/>
+            </a:solidFill>
+            <a:tailEnd type="triangle"/>
+          </a:ln>
+        </p:spPr>
+        <p:style>
+          <a:lnRef idx="1">
+            <a:schemeClr val="accent1"/>
+          </a:lnRef>
+          <a:fillRef idx="0">
+            <a:schemeClr val="accent1"/>
+          </a:fillRef>
+          <a:effectRef idx="0">
+            <a:schemeClr val="accent1"/>
+          </a:effectRef>
+          <a:fontRef idx="minor">
+            <a:schemeClr val="tx1"/>
+          </a:fontRef>
+        </p:style>
+      </p:cxnSp>
+      <p:cxnSp>
+        <p:nvCxnSpPr>
+          <p:cNvPr id="8" name="Gerade Verbindung mit Pfeil 7">
+            <a:extLst>
+              <a:ext uri="{FF2B5EF4-FFF2-40B4-BE49-F238E27FC236}">
+                <a16:creationId xmlns:a16="http://schemas.microsoft.com/office/drawing/2014/main" id="{33B9ACE4-90F9-4C05-9291-ADC479C8AB65}"/>
+              </a:ext>
+            </a:extLst>
+          </p:cNvPr>
+          <p:cNvCxnSpPr>
+            <a:cxnSpLocks/>
+          </p:cNvCxnSpPr>
+          <p:nvPr/>
+        </p:nvCxnSpPr>
+        <p:spPr>
+          <a:xfrm flipV="1">
+            <a:off x="6776097" y="2528562"/>
+            <a:ext cx="0" cy="900438"/>
+          </a:xfrm>
+          <a:prstGeom prst="straightConnector1">
+            <a:avLst/>
+          </a:prstGeom>
+          <a:ln w="57150">
+            <a:solidFill>
+              <a:srgbClr val="C00000"/>
+            </a:solidFill>
+            <a:tailEnd type="triangle"/>
+          </a:ln>
+        </p:spPr>
+        <p:style>
+          <a:lnRef idx="1">
+            <a:schemeClr val="accent1"/>
+          </a:lnRef>
+          <a:fillRef idx="0">
+            <a:schemeClr val="accent1"/>
+          </a:fillRef>
+          <a:effectRef idx="0">
+            <a:schemeClr val="accent1"/>
+          </a:effectRef>
+          <a:fontRef idx="minor">
+            <a:schemeClr val="tx1"/>
+          </a:fontRef>
+        </p:style>
+      </p:cxnSp>
+    </p:spTree>
+    <p:extLst>
+      <p:ext uri="{BB962C8B-B14F-4D97-AF65-F5344CB8AC3E}">
+        <p14:creationId xmlns:p14="http://schemas.microsoft.com/office/powerpoint/2010/main" val="1055293932"/>
+      </p:ext>
+    </p:extLst>
+  </p:cSld>
+  <p:clrMapOvr>
+    <a:masterClrMapping/>
+  </p:clrMapOvr>
+</p:sld>
+</file>
+
+<file path=ppt/slides/slide21.xml><?xml version="1.0" encoding="utf-8"?>
+<p:sld xmlns:a="http://schemas.openxmlformats.org/drawingml/2006/main" xmlns:r="http://schemas.openxmlformats.org/officeDocument/2006/relationships" xmlns:p="http://schemas.openxmlformats.org/presentationml/2006/main">
+  <p:cSld>
+    <p:spTree>
+      <p:nvGrpSpPr>
+        <p:cNvPr id="1" name=""/>
+        <p:cNvGrpSpPr/>
+        <p:nvPr/>
+      </p:nvGrpSpPr>
+      <p:grpSpPr>
+        <a:xfrm>
+          <a:off x="0" y="0"/>
+          <a:ext cx="0" cy="0"/>
+          <a:chOff x="0" y="0"/>
+          <a:chExt cx="0" cy="0"/>
+        </a:xfrm>
+      </p:grpSpPr>
+      <p:pic>
+        <p:nvPicPr>
+          <p:cNvPr id="2" name="Grafik 1">
+            <a:extLst>
+              <a:ext uri="{FF2B5EF4-FFF2-40B4-BE49-F238E27FC236}">
+                <a16:creationId xmlns:a16="http://schemas.microsoft.com/office/drawing/2014/main" id="{6425691D-36BE-4725-868E-5F63D3609E61}"/>
+              </a:ext>
+            </a:extLst>
+          </p:cNvPr>
+          <p:cNvPicPr>
+            <a:picLocks noChangeAspect="1"/>
+          </p:cNvPicPr>
+          <p:nvPr/>
+        </p:nvPicPr>
+        <p:blipFill>
+          <a:blip r:embed="rId2"/>
+          <a:stretch>
+            <a:fillRect/>
+          </a:stretch>
+        </p:blipFill>
+        <p:spPr>
+          <a:xfrm>
+            <a:off x="1908306" y="0"/>
+            <a:ext cx="8375388" cy="6858000"/>
+          </a:xfrm>
+          <a:prstGeom prst="rect">
+            <a:avLst/>
+          </a:prstGeom>
+        </p:spPr>
+      </p:pic>
+      <p:sp>
+        <p:nvSpPr>
+          <p:cNvPr id="3" name="Rechteck 2">
+            <a:extLst>
+              <a:ext uri="{FF2B5EF4-FFF2-40B4-BE49-F238E27FC236}">
+                <a16:creationId xmlns:a16="http://schemas.microsoft.com/office/drawing/2014/main" id="{6AA90B53-EC7C-4579-9F9B-2AAED3734BA7}"/>
+              </a:ext>
+            </a:extLst>
+          </p:cNvPr>
+          <p:cNvSpPr/>
+          <p:nvPr/>
+        </p:nvSpPr>
+        <p:spPr>
+          <a:xfrm>
+            <a:off x="8942664" y="6425967"/>
+            <a:ext cx="1577130" cy="432033"/>
+          </a:xfrm>
+          <a:prstGeom prst="rect">
+            <a:avLst/>
+          </a:prstGeom>
+          <a:solidFill>
+            <a:schemeClr val="bg1"/>
+          </a:solidFill>
+          <a:ln>
+            <a:solidFill>
+              <a:schemeClr val="bg1"/>
+            </a:solidFill>
+          </a:ln>
+        </p:spPr>
+        <p:style>
+          <a:lnRef idx="2">
+            <a:schemeClr val="accent1">
+              <a:shade val="50000"/>
+            </a:schemeClr>
+          </a:lnRef>
+          <a:fillRef idx="1">
+            <a:schemeClr val="accent1"/>
+          </a:fillRef>
+          <a:effectRef idx="0">
+            <a:schemeClr val="accent1"/>
+          </a:effectRef>
+          <a:fontRef idx="minor">
+            <a:schemeClr val="lt1"/>
+          </a:fontRef>
+        </p:style>
+        <p:txBody>
+          <a:bodyPr rtlCol="0" anchor="ctr"/>
+          <a:lstStyle/>
+          <a:p>
+            <a:pPr algn="ctr"/>
+            <a:endParaRPr lang="de-DE"/>
+          </a:p>
+        </p:txBody>
+      </p:sp>
+    </p:spTree>
+    <p:extLst>
+      <p:ext uri="{BB962C8B-B14F-4D97-AF65-F5344CB8AC3E}">
+        <p14:creationId xmlns:p14="http://schemas.microsoft.com/office/powerpoint/2010/main" val="1272185363"/>
       </p:ext>
     </p:extLst>
   </p:cSld>

</xml_diff>